<commit_message>
Desenho de Solução Neg/Tec
</commit_message>
<xml_diff>
--- a/Tecnologia da informação/Desenho Solução.pptx
+++ b/Tecnologia da informação/Desenho Solução.pptx
@@ -105,6 +105,22 @@
       </a:defRPr>
     </a:lvl9pPr>
   </p:defaultTextStyle>
+  <p:extLst>
+    <p:ext uri="{EFAFB233-063F-42B5-8137-9DF3F51BA10A}">
+      <p15:sldGuideLst xmlns:p15="http://schemas.microsoft.com/office/powerpoint/2012/main">
+        <p15:guide id="1" orient="horz" pos="2160">
+          <p15:clr>
+            <a:srgbClr val="A4A3A4"/>
+          </p15:clr>
+        </p15:guide>
+        <p15:guide id="2" pos="3840">
+          <p15:clr>
+            <a:srgbClr val="A4A3A4"/>
+          </p15:clr>
+        </p15:guide>
+      </p15:sldGuideLst>
+    </p:ext>
+  </p:extLst>
 </p:presentation>
 </file>
 
@@ -150,10 +166,9 @@
           </a:lstStyle>
           <a:p>
             <a:r>
-              <a:rPr lang="pt-BR" smtClean="0"/>
+              <a:rPr lang="pt-BR"/>
               <a:t>Clique para editar o título mestre</a:t>
             </a:r>
-            <a:endParaRPr lang="pt-BR"/>
           </a:p>
         </p:txBody>
       </p:sp>
@@ -215,10 +230,9 @@
           </a:lstStyle>
           <a:p>
             <a:r>
-              <a:rPr lang="pt-BR" smtClean="0"/>
+              <a:rPr lang="pt-BR"/>
               <a:t>Clique para editar o estilo do subtítulo Mestre</a:t>
             </a:r>
-            <a:endParaRPr lang="pt-BR"/>
           </a:p>
         </p:txBody>
       </p:sp>
@@ -239,7 +253,8 @@
           <a:p>
             <a:fld id="{8D1B14B3-4E67-4017-A5AF-87E0EB3FF619}" type="datetimeFigureOut">
               <a:rPr lang="pt-BR" smtClean="0"/>
-              <a:t>20/09/2021</a:t>
+              <a:pPr/>
+              <a:t>27/09/2021</a:t>
             </a:fld>
             <a:endParaRPr lang="pt-BR"/>
           </a:p>
@@ -281,6 +296,7 @@
           <a:p>
             <a:fld id="{741B7911-D1FE-4C92-9F65-EC82FB3C9DF0}" type="slidenum">
               <a:rPr lang="pt-BR" smtClean="0"/>
+              <a:pPr/>
               <a:t>‹nº›</a:t>
             </a:fld>
             <a:endParaRPr lang="pt-BR"/>
@@ -333,10 +349,9 @@
           <a:lstStyle/>
           <a:p>
             <a:r>
-              <a:rPr lang="pt-BR" smtClean="0"/>
+              <a:rPr lang="pt-BR"/>
               <a:t>Clique para editar o título mestre</a:t>
             </a:r>
-            <a:endParaRPr lang="pt-BR"/>
           </a:p>
         </p:txBody>
       </p:sp>
@@ -357,38 +372,37 @@
           <a:p>
             <a:pPr lvl="0"/>
             <a:r>
-              <a:rPr lang="pt-BR" smtClean="0"/>
+              <a:rPr lang="pt-BR"/>
               <a:t>Editar estilos de texto Mestre</a:t>
             </a:r>
           </a:p>
           <a:p>
             <a:pPr lvl="1"/>
             <a:r>
-              <a:rPr lang="pt-BR" smtClean="0"/>
+              <a:rPr lang="pt-BR"/>
               <a:t>Segundo nível</a:t>
             </a:r>
           </a:p>
           <a:p>
             <a:pPr lvl="2"/>
             <a:r>
-              <a:rPr lang="pt-BR" smtClean="0"/>
+              <a:rPr lang="pt-BR"/>
               <a:t>Terceiro nível</a:t>
             </a:r>
           </a:p>
           <a:p>
             <a:pPr lvl="3"/>
             <a:r>
-              <a:rPr lang="pt-BR" smtClean="0"/>
+              <a:rPr lang="pt-BR"/>
               <a:t>Quarto nível</a:t>
             </a:r>
           </a:p>
           <a:p>
             <a:pPr lvl="4"/>
             <a:r>
-              <a:rPr lang="pt-BR" smtClean="0"/>
+              <a:rPr lang="pt-BR"/>
               <a:t>Quinto nível</a:t>
             </a:r>
-            <a:endParaRPr lang="pt-BR"/>
           </a:p>
         </p:txBody>
       </p:sp>
@@ -409,7 +423,8 @@
           <a:p>
             <a:fld id="{8D1B14B3-4E67-4017-A5AF-87E0EB3FF619}" type="datetimeFigureOut">
               <a:rPr lang="pt-BR" smtClean="0"/>
-              <a:t>20/09/2021</a:t>
+              <a:pPr/>
+              <a:t>27/09/2021</a:t>
             </a:fld>
             <a:endParaRPr lang="pt-BR"/>
           </a:p>
@@ -451,6 +466,7 @@
           <a:p>
             <a:fld id="{741B7911-D1FE-4C92-9F65-EC82FB3C9DF0}" type="slidenum">
               <a:rPr lang="pt-BR" smtClean="0"/>
+              <a:pPr/>
               <a:t>‹nº›</a:t>
             </a:fld>
             <a:endParaRPr lang="pt-BR"/>
@@ -508,10 +524,9 @@
           <a:lstStyle/>
           <a:p>
             <a:r>
-              <a:rPr lang="pt-BR" smtClean="0"/>
+              <a:rPr lang="pt-BR"/>
               <a:t>Clique para editar o título mestre</a:t>
             </a:r>
-            <a:endParaRPr lang="pt-BR"/>
           </a:p>
         </p:txBody>
       </p:sp>
@@ -537,38 +552,37 @@
           <a:p>
             <a:pPr lvl="0"/>
             <a:r>
-              <a:rPr lang="pt-BR" smtClean="0"/>
+              <a:rPr lang="pt-BR"/>
               <a:t>Editar estilos de texto Mestre</a:t>
             </a:r>
           </a:p>
           <a:p>
             <a:pPr lvl="1"/>
             <a:r>
-              <a:rPr lang="pt-BR" smtClean="0"/>
+              <a:rPr lang="pt-BR"/>
               <a:t>Segundo nível</a:t>
             </a:r>
           </a:p>
           <a:p>
             <a:pPr lvl="2"/>
             <a:r>
-              <a:rPr lang="pt-BR" smtClean="0"/>
+              <a:rPr lang="pt-BR"/>
               <a:t>Terceiro nível</a:t>
             </a:r>
           </a:p>
           <a:p>
             <a:pPr lvl="3"/>
             <a:r>
-              <a:rPr lang="pt-BR" smtClean="0"/>
+              <a:rPr lang="pt-BR"/>
               <a:t>Quarto nível</a:t>
             </a:r>
           </a:p>
           <a:p>
             <a:pPr lvl="4"/>
             <a:r>
-              <a:rPr lang="pt-BR" smtClean="0"/>
+              <a:rPr lang="pt-BR"/>
               <a:t>Quinto nível</a:t>
             </a:r>
-            <a:endParaRPr lang="pt-BR"/>
           </a:p>
         </p:txBody>
       </p:sp>
@@ -589,7 +603,8 @@
           <a:p>
             <a:fld id="{8D1B14B3-4E67-4017-A5AF-87E0EB3FF619}" type="datetimeFigureOut">
               <a:rPr lang="pt-BR" smtClean="0"/>
-              <a:t>20/09/2021</a:t>
+              <a:pPr/>
+              <a:t>27/09/2021</a:t>
             </a:fld>
             <a:endParaRPr lang="pt-BR"/>
           </a:p>
@@ -631,6 +646,7 @@
           <a:p>
             <a:fld id="{741B7911-D1FE-4C92-9F65-EC82FB3C9DF0}" type="slidenum">
               <a:rPr lang="pt-BR" smtClean="0"/>
+              <a:pPr/>
               <a:t>‹nº›</a:t>
             </a:fld>
             <a:endParaRPr lang="pt-BR"/>
@@ -683,10 +699,9 @@
           <a:lstStyle/>
           <a:p>
             <a:r>
-              <a:rPr lang="pt-BR" smtClean="0"/>
+              <a:rPr lang="pt-BR"/>
               <a:t>Clique para editar o título mestre</a:t>
             </a:r>
-            <a:endParaRPr lang="pt-BR"/>
           </a:p>
         </p:txBody>
       </p:sp>
@@ -707,38 +722,37 @@
           <a:p>
             <a:pPr lvl="0"/>
             <a:r>
-              <a:rPr lang="pt-BR" smtClean="0"/>
+              <a:rPr lang="pt-BR"/>
               <a:t>Editar estilos de texto Mestre</a:t>
             </a:r>
           </a:p>
           <a:p>
             <a:pPr lvl="1"/>
             <a:r>
-              <a:rPr lang="pt-BR" smtClean="0"/>
+              <a:rPr lang="pt-BR"/>
               <a:t>Segundo nível</a:t>
             </a:r>
           </a:p>
           <a:p>
             <a:pPr lvl="2"/>
             <a:r>
-              <a:rPr lang="pt-BR" smtClean="0"/>
+              <a:rPr lang="pt-BR"/>
               <a:t>Terceiro nível</a:t>
             </a:r>
           </a:p>
           <a:p>
             <a:pPr lvl="3"/>
             <a:r>
-              <a:rPr lang="pt-BR" smtClean="0"/>
+              <a:rPr lang="pt-BR"/>
               <a:t>Quarto nível</a:t>
             </a:r>
           </a:p>
           <a:p>
             <a:pPr lvl="4"/>
             <a:r>
-              <a:rPr lang="pt-BR" smtClean="0"/>
+              <a:rPr lang="pt-BR"/>
               <a:t>Quinto nível</a:t>
             </a:r>
-            <a:endParaRPr lang="pt-BR"/>
           </a:p>
         </p:txBody>
       </p:sp>
@@ -759,7 +773,8 @@
           <a:p>
             <a:fld id="{8D1B14B3-4E67-4017-A5AF-87E0EB3FF619}" type="datetimeFigureOut">
               <a:rPr lang="pt-BR" smtClean="0"/>
-              <a:t>20/09/2021</a:t>
+              <a:pPr/>
+              <a:t>27/09/2021</a:t>
             </a:fld>
             <a:endParaRPr lang="pt-BR"/>
           </a:p>
@@ -801,6 +816,7 @@
           <a:p>
             <a:fld id="{741B7911-D1FE-4C92-9F65-EC82FB3C9DF0}" type="slidenum">
               <a:rPr lang="pt-BR" smtClean="0"/>
+              <a:pPr/>
               <a:t>‹nº›</a:t>
             </a:fld>
             <a:endParaRPr lang="pt-BR"/>
@@ -862,10 +878,9 @@
           </a:lstStyle>
           <a:p>
             <a:r>
-              <a:rPr lang="pt-BR" smtClean="0"/>
+              <a:rPr lang="pt-BR"/>
               <a:t>Clique para editar o título mestre</a:t>
             </a:r>
-            <a:endParaRPr lang="pt-BR"/>
           </a:p>
         </p:txBody>
       </p:sp>
@@ -982,7 +997,7 @@
           <a:p>
             <a:pPr lvl="0"/>
             <a:r>
-              <a:rPr lang="pt-BR" smtClean="0"/>
+              <a:rPr lang="pt-BR"/>
               <a:t>Editar estilos de texto Mestre</a:t>
             </a:r>
           </a:p>
@@ -1005,7 +1020,8 @@
           <a:p>
             <a:fld id="{8D1B14B3-4E67-4017-A5AF-87E0EB3FF619}" type="datetimeFigureOut">
               <a:rPr lang="pt-BR" smtClean="0"/>
-              <a:t>20/09/2021</a:t>
+              <a:pPr/>
+              <a:t>27/09/2021</a:t>
             </a:fld>
             <a:endParaRPr lang="pt-BR"/>
           </a:p>
@@ -1047,6 +1063,7 @@
           <a:p>
             <a:fld id="{741B7911-D1FE-4C92-9F65-EC82FB3C9DF0}" type="slidenum">
               <a:rPr lang="pt-BR" smtClean="0"/>
+              <a:pPr/>
               <a:t>‹nº›</a:t>
             </a:fld>
             <a:endParaRPr lang="pt-BR"/>
@@ -1099,10 +1116,9 @@
           <a:lstStyle/>
           <a:p>
             <a:r>
-              <a:rPr lang="pt-BR" smtClean="0"/>
+              <a:rPr lang="pt-BR"/>
               <a:t>Clique para editar o título mestre</a:t>
             </a:r>
-            <a:endParaRPr lang="pt-BR"/>
           </a:p>
         </p:txBody>
       </p:sp>
@@ -1128,38 +1144,37 @@
           <a:p>
             <a:pPr lvl="0"/>
             <a:r>
-              <a:rPr lang="pt-BR" smtClean="0"/>
+              <a:rPr lang="pt-BR"/>
               <a:t>Editar estilos de texto Mestre</a:t>
             </a:r>
           </a:p>
           <a:p>
             <a:pPr lvl="1"/>
             <a:r>
-              <a:rPr lang="pt-BR" smtClean="0"/>
+              <a:rPr lang="pt-BR"/>
               <a:t>Segundo nível</a:t>
             </a:r>
           </a:p>
           <a:p>
             <a:pPr lvl="2"/>
             <a:r>
-              <a:rPr lang="pt-BR" smtClean="0"/>
+              <a:rPr lang="pt-BR"/>
               <a:t>Terceiro nível</a:t>
             </a:r>
           </a:p>
           <a:p>
             <a:pPr lvl="3"/>
             <a:r>
-              <a:rPr lang="pt-BR" smtClean="0"/>
+              <a:rPr lang="pt-BR"/>
               <a:t>Quarto nível</a:t>
             </a:r>
           </a:p>
           <a:p>
             <a:pPr lvl="4"/>
             <a:r>
-              <a:rPr lang="pt-BR" smtClean="0"/>
+              <a:rPr lang="pt-BR"/>
               <a:t>Quinto nível</a:t>
             </a:r>
-            <a:endParaRPr lang="pt-BR"/>
           </a:p>
         </p:txBody>
       </p:sp>
@@ -1185,38 +1200,37 @@
           <a:p>
             <a:pPr lvl="0"/>
             <a:r>
-              <a:rPr lang="pt-BR" smtClean="0"/>
+              <a:rPr lang="pt-BR"/>
               <a:t>Editar estilos de texto Mestre</a:t>
             </a:r>
           </a:p>
           <a:p>
             <a:pPr lvl="1"/>
             <a:r>
-              <a:rPr lang="pt-BR" smtClean="0"/>
+              <a:rPr lang="pt-BR"/>
               <a:t>Segundo nível</a:t>
             </a:r>
           </a:p>
           <a:p>
             <a:pPr lvl="2"/>
             <a:r>
-              <a:rPr lang="pt-BR" smtClean="0"/>
+              <a:rPr lang="pt-BR"/>
               <a:t>Terceiro nível</a:t>
             </a:r>
           </a:p>
           <a:p>
             <a:pPr lvl="3"/>
             <a:r>
-              <a:rPr lang="pt-BR" smtClean="0"/>
+              <a:rPr lang="pt-BR"/>
               <a:t>Quarto nível</a:t>
             </a:r>
           </a:p>
           <a:p>
             <a:pPr lvl="4"/>
             <a:r>
-              <a:rPr lang="pt-BR" smtClean="0"/>
+              <a:rPr lang="pt-BR"/>
               <a:t>Quinto nível</a:t>
             </a:r>
-            <a:endParaRPr lang="pt-BR"/>
           </a:p>
         </p:txBody>
       </p:sp>
@@ -1237,7 +1251,8 @@
           <a:p>
             <a:fld id="{8D1B14B3-4E67-4017-A5AF-87E0EB3FF619}" type="datetimeFigureOut">
               <a:rPr lang="pt-BR" smtClean="0"/>
-              <a:t>20/09/2021</a:t>
+              <a:pPr/>
+              <a:t>27/09/2021</a:t>
             </a:fld>
             <a:endParaRPr lang="pt-BR"/>
           </a:p>
@@ -1279,6 +1294,7 @@
           <a:p>
             <a:fld id="{741B7911-D1FE-4C92-9F65-EC82FB3C9DF0}" type="slidenum">
               <a:rPr lang="pt-BR" smtClean="0"/>
+              <a:pPr/>
               <a:t>‹nº›</a:t>
             </a:fld>
             <a:endParaRPr lang="pt-BR"/>
@@ -1336,10 +1352,9 @@
           <a:lstStyle/>
           <a:p>
             <a:r>
-              <a:rPr lang="pt-BR" smtClean="0"/>
+              <a:rPr lang="pt-BR"/>
               <a:t>Clique para editar o título mestre</a:t>
             </a:r>
-            <a:endParaRPr lang="pt-BR"/>
           </a:p>
         </p:txBody>
       </p:sp>
@@ -1402,7 +1417,7 @@
           <a:p>
             <a:pPr lvl="0"/>
             <a:r>
-              <a:rPr lang="pt-BR" smtClean="0"/>
+              <a:rPr lang="pt-BR"/>
               <a:t>Editar estilos de texto Mestre</a:t>
             </a:r>
           </a:p>
@@ -1430,38 +1445,37 @@
           <a:p>
             <a:pPr lvl="0"/>
             <a:r>
-              <a:rPr lang="pt-BR" smtClean="0"/>
+              <a:rPr lang="pt-BR"/>
               <a:t>Editar estilos de texto Mestre</a:t>
             </a:r>
           </a:p>
           <a:p>
             <a:pPr lvl="1"/>
             <a:r>
-              <a:rPr lang="pt-BR" smtClean="0"/>
+              <a:rPr lang="pt-BR"/>
               <a:t>Segundo nível</a:t>
             </a:r>
           </a:p>
           <a:p>
             <a:pPr lvl="2"/>
             <a:r>
-              <a:rPr lang="pt-BR" smtClean="0"/>
+              <a:rPr lang="pt-BR"/>
               <a:t>Terceiro nível</a:t>
             </a:r>
           </a:p>
           <a:p>
             <a:pPr lvl="3"/>
             <a:r>
-              <a:rPr lang="pt-BR" smtClean="0"/>
+              <a:rPr lang="pt-BR"/>
               <a:t>Quarto nível</a:t>
             </a:r>
           </a:p>
           <a:p>
             <a:pPr lvl="4"/>
             <a:r>
-              <a:rPr lang="pt-BR" smtClean="0"/>
+              <a:rPr lang="pt-BR"/>
               <a:t>Quinto nível</a:t>
             </a:r>
-            <a:endParaRPr lang="pt-BR"/>
           </a:p>
         </p:txBody>
       </p:sp>
@@ -1524,7 +1538,7 @@
           <a:p>
             <a:pPr lvl="0"/>
             <a:r>
-              <a:rPr lang="pt-BR" smtClean="0"/>
+              <a:rPr lang="pt-BR"/>
               <a:t>Editar estilos de texto Mestre</a:t>
             </a:r>
           </a:p>
@@ -1552,38 +1566,37 @@
           <a:p>
             <a:pPr lvl="0"/>
             <a:r>
-              <a:rPr lang="pt-BR" smtClean="0"/>
+              <a:rPr lang="pt-BR"/>
               <a:t>Editar estilos de texto Mestre</a:t>
             </a:r>
           </a:p>
           <a:p>
             <a:pPr lvl="1"/>
             <a:r>
-              <a:rPr lang="pt-BR" smtClean="0"/>
+              <a:rPr lang="pt-BR"/>
               <a:t>Segundo nível</a:t>
             </a:r>
           </a:p>
           <a:p>
             <a:pPr lvl="2"/>
             <a:r>
-              <a:rPr lang="pt-BR" smtClean="0"/>
+              <a:rPr lang="pt-BR"/>
               <a:t>Terceiro nível</a:t>
             </a:r>
           </a:p>
           <a:p>
             <a:pPr lvl="3"/>
             <a:r>
-              <a:rPr lang="pt-BR" smtClean="0"/>
+              <a:rPr lang="pt-BR"/>
               <a:t>Quarto nível</a:t>
             </a:r>
           </a:p>
           <a:p>
             <a:pPr lvl="4"/>
             <a:r>
-              <a:rPr lang="pt-BR" smtClean="0"/>
+              <a:rPr lang="pt-BR"/>
               <a:t>Quinto nível</a:t>
             </a:r>
-            <a:endParaRPr lang="pt-BR"/>
           </a:p>
         </p:txBody>
       </p:sp>
@@ -1604,7 +1617,8 @@
           <a:p>
             <a:fld id="{8D1B14B3-4E67-4017-A5AF-87E0EB3FF619}" type="datetimeFigureOut">
               <a:rPr lang="pt-BR" smtClean="0"/>
-              <a:t>20/09/2021</a:t>
+              <a:pPr/>
+              <a:t>27/09/2021</a:t>
             </a:fld>
             <a:endParaRPr lang="pt-BR"/>
           </a:p>
@@ -1646,6 +1660,7 @@
           <a:p>
             <a:fld id="{741B7911-D1FE-4C92-9F65-EC82FB3C9DF0}" type="slidenum">
               <a:rPr lang="pt-BR" smtClean="0"/>
+              <a:pPr/>
               <a:t>‹nº›</a:t>
             </a:fld>
             <a:endParaRPr lang="pt-BR"/>
@@ -1698,10 +1713,9 @@
           <a:lstStyle/>
           <a:p>
             <a:r>
-              <a:rPr lang="pt-BR" smtClean="0"/>
+              <a:rPr lang="pt-BR"/>
               <a:t>Clique para editar o título mestre</a:t>
             </a:r>
-            <a:endParaRPr lang="pt-BR"/>
           </a:p>
         </p:txBody>
       </p:sp>
@@ -1722,7 +1736,8 @@
           <a:p>
             <a:fld id="{8D1B14B3-4E67-4017-A5AF-87E0EB3FF619}" type="datetimeFigureOut">
               <a:rPr lang="pt-BR" smtClean="0"/>
-              <a:t>20/09/2021</a:t>
+              <a:pPr/>
+              <a:t>27/09/2021</a:t>
             </a:fld>
             <a:endParaRPr lang="pt-BR"/>
           </a:p>
@@ -1764,6 +1779,7 @@
           <a:p>
             <a:fld id="{741B7911-D1FE-4C92-9F65-EC82FB3C9DF0}" type="slidenum">
               <a:rPr lang="pt-BR" smtClean="0"/>
+              <a:pPr/>
               <a:t>‹nº›</a:t>
             </a:fld>
             <a:endParaRPr lang="pt-BR"/>
@@ -1817,7 +1833,8 @@
           <a:p>
             <a:fld id="{8D1B14B3-4E67-4017-A5AF-87E0EB3FF619}" type="datetimeFigureOut">
               <a:rPr lang="pt-BR" smtClean="0"/>
-              <a:t>20/09/2021</a:t>
+              <a:pPr/>
+              <a:t>27/09/2021</a:t>
             </a:fld>
             <a:endParaRPr lang="pt-BR"/>
           </a:p>
@@ -1859,6 +1876,7 @@
           <a:p>
             <a:fld id="{741B7911-D1FE-4C92-9F65-EC82FB3C9DF0}" type="slidenum">
               <a:rPr lang="pt-BR" smtClean="0"/>
+              <a:pPr/>
               <a:t>‹nº›</a:t>
             </a:fld>
             <a:endParaRPr lang="pt-BR"/>
@@ -1920,10 +1938,9 @@
           </a:lstStyle>
           <a:p>
             <a:r>
-              <a:rPr lang="pt-BR" smtClean="0"/>
+              <a:rPr lang="pt-BR"/>
               <a:t>Clique para editar o título mestre</a:t>
             </a:r>
-            <a:endParaRPr lang="pt-BR"/>
           </a:p>
         </p:txBody>
       </p:sp>
@@ -1977,38 +1994,37 @@
           <a:p>
             <a:pPr lvl="0"/>
             <a:r>
-              <a:rPr lang="pt-BR" smtClean="0"/>
+              <a:rPr lang="pt-BR"/>
               <a:t>Editar estilos de texto Mestre</a:t>
             </a:r>
           </a:p>
           <a:p>
             <a:pPr lvl="1"/>
             <a:r>
-              <a:rPr lang="pt-BR" smtClean="0"/>
+              <a:rPr lang="pt-BR"/>
               <a:t>Segundo nível</a:t>
             </a:r>
           </a:p>
           <a:p>
             <a:pPr lvl="2"/>
             <a:r>
-              <a:rPr lang="pt-BR" smtClean="0"/>
+              <a:rPr lang="pt-BR"/>
               <a:t>Terceiro nível</a:t>
             </a:r>
           </a:p>
           <a:p>
             <a:pPr lvl="3"/>
             <a:r>
-              <a:rPr lang="pt-BR" smtClean="0"/>
+              <a:rPr lang="pt-BR"/>
               <a:t>Quarto nível</a:t>
             </a:r>
           </a:p>
           <a:p>
             <a:pPr lvl="4"/>
             <a:r>
-              <a:rPr lang="pt-BR" smtClean="0"/>
+              <a:rPr lang="pt-BR"/>
               <a:t>Quinto nível</a:t>
             </a:r>
-            <a:endParaRPr lang="pt-BR"/>
           </a:p>
         </p:txBody>
       </p:sp>
@@ -2071,7 +2087,7 @@
           <a:p>
             <a:pPr lvl="0"/>
             <a:r>
-              <a:rPr lang="pt-BR" smtClean="0"/>
+              <a:rPr lang="pt-BR"/>
               <a:t>Editar estilos de texto Mestre</a:t>
             </a:r>
           </a:p>
@@ -2094,7 +2110,8 @@
           <a:p>
             <a:fld id="{8D1B14B3-4E67-4017-A5AF-87E0EB3FF619}" type="datetimeFigureOut">
               <a:rPr lang="pt-BR" smtClean="0"/>
-              <a:t>20/09/2021</a:t>
+              <a:pPr/>
+              <a:t>27/09/2021</a:t>
             </a:fld>
             <a:endParaRPr lang="pt-BR"/>
           </a:p>
@@ -2136,6 +2153,7 @@
           <a:p>
             <a:fld id="{741B7911-D1FE-4C92-9F65-EC82FB3C9DF0}" type="slidenum">
               <a:rPr lang="pt-BR" smtClean="0"/>
+              <a:pPr/>
               <a:t>‹nº›</a:t>
             </a:fld>
             <a:endParaRPr lang="pt-BR"/>
@@ -2197,10 +2215,9 @@
           </a:lstStyle>
           <a:p>
             <a:r>
-              <a:rPr lang="pt-BR" smtClean="0"/>
+              <a:rPr lang="pt-BR"/>
               <a:t>Clique para editar o título mestre</a:t>
             </a:r>
-            <a:endParaRPr lang="pt-BR"/>
           </a:p>
         </p:txBody>
       </p:sp>
@@ -2324,7 +2341,7 @@
           <a:p>
             <a:pPr lvl="0"/>
             <a:r>
-              <a:rPr lang="pt-BR" smtClean="0"/>
+              <a:rPr lang="pt-BR"/>
               <a:t>Editar estilos de texto Mestre</a:t>
             </a:r>
           </a:p>
@@ -2347,7 +2364,8 @@
           <a:p>
             <a:fld id="{8D1B14B3-4E67-4017-A5AF-87E0EB3FF619}" type="datetimeFigureOut">
               <a:rPr lang="pt-BR" smtClean="0"/>
-              <a:t>20/09/2021</a:t>
+              <a:pPr/>
+              <a:t>27/09/2021</a:t>
             </a:fld>
             <a:endParaRPr lang="pt-BR"/>
           </a:p>
@@ -2389,6 +2407,7 @@
           <a:p>
             <a:fld id="{741B7911-D1FE-4C92-9F65-EC82FB3C9DF0}" type="slidenum">
               <a:rPr lang="pt-BR" smtClean="0"/>
+              <a:pPr/>
               <a:t>‹nº›</a:t>
             </a:fld>
             <a:endParaRPr lang="pt-BR"/>
@@ -2456,10 +2475,9 @@
           <a:lstStyle/>
           <a:p>
             <a:r>
-              <a:rPr lang="pt-BR" smtClean="0"/>
+              <a:rPr lang="pt-BR"/>
               <a:t>Clique para editar o título mestre</a:t>
             </a:r>
-            <a:endParaRPr lang="pt-BR"/>
           </a:p>
         </p:txBody>
       </p:sp>
@@ -2490,38 +2508,37 @@
           <a:p>
             <a:pPr lvl="0"/>
             <a:r>
-              <a:rPr lang="pt-BR" smtClean="0"/>
+              <a:rPr lang="pt-BR"/>
               <a:t>Editar estilos de texto Mestre</a:t>
             </a:r>
           </a:p>
           <a:p>
             <a:pPr lvl="1"/>
             <a:r>
-              <a:rPr lang="pt-BR" smtClean="0"/>
+              <a:rPr lang="pt-BR"/>
               <a:t>Segundo nível</a:t>
             </a:r>
           </a:p>
           <a:p>
             <a:pPr lvl="2"/>
             <a:r>
-              <a:rPr lang="pt-BR" smtClean="0"/>
+              <a:rPr lang="pt-BR"/>
               <a:t>Terceiro nível</a:t>
             </a:r>
           </a:p>
           <a:p>
             <a:pPr lvl="3"/>
             <a:r>
-              <a:rPr lang="pt-BR" smtClean="0"/>
+              <a:rPr lang="pt-BR"/>
               <a:t>Quarto nível</a:t>
             </a:r>
           </a:p>
           <a:p>
             <a:pPr lvl="4"/>
             <a:r>
-              <a:rPr lang="pt-BR" smtClean="0"/>
+              <a:rPr lang="pt-BR"/>
               <a:t>Quinto nível</a:t>
             </a:r>
-            <a:endParaRPr lang="pt-BR"/>
           </a:p>
         </p:txBody>
       </p:sp>
@@ -2560,7 +2577,8 @@
           <a:p>
             <a:fld id="{8D1B14B3-4E67-4017-A5AF-87E0EB3FF619}" type="datetimeFigureOut">
               <a:rPr lang="pt-BR" smtClean="0"/>
-              <a:t>20/09/2021</a:t>
+              <a:pPr/>
+              <a:t>27/09/2021</a:t>
             </a:fld>
             <a:endParaRPr lang="pt-BR"/>
           </a:p>
@@ -2638,6 +2656,7 @@
           <a:p>
             <a:fld id="{741B7911-D1FE-4C92-9F65-EC82FB3C9DF0}" type="slidenum">
               <a:rPr lang="pt-BR" smtClean="0"/>
+              <a:pPr/>
               <a:t>‹nº›</a:t>
             </a:fld>
             <a:endParaRPr lang="pt-BR"/>
@@ -2967,36 +2986,6 @@
       </p:grpSpPr>
       <p:sp>
         <p:nvSpPr>
-          <p:cNvPr id="2" name="Título 1"/>
-          <p:cNvSpPr>
-            <a:spLocks noGrp="1"/>
-          </p:cNvSpPr>
-          <p:nvPr>
-            <p:ph type="ctrTitle"/>
-          </p:nvPr>
-        </p:nvSpPr>
-        <p:spPr>
-          <a:xfrm>
-            <a:off x="682518" y="2991162"/>
-            <a:ext cx="1145176" cy="374877"/>
-          </a:xfrm>
-        </p:spPr>
-        <p:txBody>
-          <a:bodyPr>
-            <a:normAutofit fontScale="90000"/>
-          </a:bodyPr>
-          <a:lstStyle/>
-          <a:p>
-            <a:r>
-              <a:rPr lang="pt-BR" sz="1100" b="1" dirty="0" smtClean="0"/>
-              <a:t>Sensor de Proximidade</a:t>
-            </a:r>
-            <a:endParaRPr lang="pt-BR" sz="1100" b="1" dirty="0"/>
-          </a:p>
-        </p:txBody>
-      </p:sp>
-      <p:sp>
-        <p:nvSpPr>
           <p:cNvPr id="3" name="Subtítulo 2"/>
           <p:cNvSpPr>
             <a:spLocks noGrp="1"/>
@@ -3059,8 +3048,8 @@
         </p:nvSpPr>
         <p:spPr>
           <a:xfrm>
-            <a:off x="571022" y="1780938"/>
-            <a:ext cx="1384663" cy="3402875"/>
+            <a:off x="210207" y="1780938"/>
+            <a:ext cx="2165131" cy="3402875"/>
           </a:xfrm>
           <a:prstGeom prst="rect">
             <a:avLst/>
@@ -3097,9 +3086,45 @@
           </a:p>
         </p:txBody>
       </p:sp>
+      <p:cxnSp>
+        <p:nvCxnSpPr>
+          <p:cNvPr id="14" name="Conector de Seta Reta 13"/>
+          <p:cNvCxnSpPr/>
+          <p:nvPr/>
+        </p:nvCxnSpPr>
+        <p:spPr>
+          <a:xfrm>
+            <a:off x="4036423" y="3642675"/>
+            <a:ext cx="535577" cy="0"/>
+          </a:xfrm>
+          <a:prstGeom prst="straightConnector1">
+            <a:avLst/>
+          </a:prstGeom>
+          <a:ln>
+            <a:solidFill>
+              <a:schemeClr val="tx1"/>
+            </a:solidFill>
+            <a:tailEnd type="triangle"/>
+          </a:ln>
+        </p:spPr>
+        <p:style>
+          <a:lnRef idx="1">
+            <a:schemeClr val="accent1"/>
+          </a:lnRef>
+          <a:fillRef idx="0">
+            <a:schemeClr val="accent1"/>
+          </a:fillRef>
+          <a:effectRef idx="0">
+            <a:schemeClr val="accent1"/>
+          </a:effectRef>
+          <a:fontRef idx="minor">
+            <a:schemeClr val="tx1"/>
+          </a:fontRef>
+        </p:style>
+      </p:cxnSp>
       <p:pic>
         <p:nvPicPr>
-          <p:cNvPr id="7" name="Imagem 6"/>
+          <p:cNvPr id="18" name="Imagem 17"/>
           <p:cNvPicPr>
             <a:picLocks noChangeAspect="1"/>
           </p:cNvPicPr>
@@ -3119,17 +3144,53 @@
         </p:blipFill>
         <p:spPr>
           <a:xfrm>
-            <a:off x="785165" y="3619953"/>
-            <a:ext cx="978100" cy="978100"/>
+            <a:off x="4986158" y="3394380"/>
+            <a:ext cx="609295" cy="609295"/>
           </a:xfrm>
           <a:prstGeom prst="rect">
             <a:avLst/>
           </a:prstGeom>
         </p:spPr>
       </p:pic>
+      <p:cxnSp>
+        <p:nvCxnSpPr>
+          <p:cNvPr id="20" name="Conector de Seta Reta 19"/>
+          <p:cNvCxnSpPr/>
+          <p:nvPr/>
+        </p:nvCxnSpPr>
+        <p:spPr>
+          <a:xfrm>
+            <a:off x="5956663" y="3642675"/>
+            <a:ext cx="535577" cy="0"/>
+          </a:xfrm>
+          <a:prstGeom prst="straightConnector1">
+            <a:avLst/>
+          </a:prstGeom>
+          <a:ln>
+            <a:solidFill>
+              <a:schemeClr val="tx1"/>
+            </a:solidFill>
+            <a:tailEnd type="triangle"/>
+          </a:ln>
+        </p:spPr>
+        <p:style>
+          <a:lnRef idx="1">
+            <a:schemeClr val="accent1"/>
+          </a:lnRef>
+          <a:fillRef idx="0">
+            <a:schemeClr val="accent1"/>
+          </a:fillRef>
+          <a:effectRef idx="0">
+            <a:schemeClr val="accent1"/>
+          </a:effectRef>
+          <a:fontRef idx="minor">
+            <a:schemeClr val="tx1"/>
+          </a:fontRef>
+        </p:style>
+      </p:cxnSp>
       <p:pic>
         <p:nvPicPr>
-          <p:cNvPr id="8" name="Imagem 7"/>
+          <p:cNvPr id="21" name="Imagem 20"/>
           <p:cNvPicPr>
             <a:picLocks noChangeAspect="1"/>
           </p:cNvPicPr>
@@ -3149,183 +3210,26 @@
         </p:blipFill>
         <p:spPr>
           <a:xfrm>
-            <a:off x="785165" y="1996294"/>
-            <a:ext cx="970701" cy="970701"/>
+            <a:off x="6778691" y="3116142"/>
+            <a:ext cx="1187139" cy="1187139"/>
           </a:xfrm>
           <a:prstGeom prst="rect">
             <a:avLst/>
           </a:prstGeom>
         </p:spPr>
       </p:pic>
-      <p:sp>
-        <p:nvSpPr>
-          <p:cNvPr id="9" name="CaixaDeTexto 8"/>
-          <p:cNvSpPr txBox="1"/>
-          <p:nvPr/>
-        </p:nvSpPr>
-        <p:spPr>
-          <a:xfrm>
-            <a:off x="851873" y="4617220"/>
-            <a:ext cx="822960" cy="430887"/>
-          </a:xfrm>
-          <a:prstGeom prst="rect">
-            <a:avLst/>
-          </a:prstGeom>
-          <a:noFill/>
-        </p:spPr>
-        <p:txBody>
-          <a:bodyPr wrap="square" rtlCol="0">
-            <a:spAutoFit/>
-          </a:bodyPr>
-          <a:lstStyle/>
-          <a:p>
-            <a:pPr algn="ctr"/>
-            <a:r>
-              <a:rPr lang="pt-BR" sz="1100" b="1" dirty="0" smtClean="0">
-                <a:latin typeface="+mj-lt"/>
-              </a:rPr>
-              <a:t>Sensor de Iluminação</a:t>
-            </a:r>
-            <a:endParaRPr lang="pt-BR" sz="1100" b="1" dirty="0">
-              <a:latin typeface="+mj-lt"/>
-            </a:endParaRPr>
-          </a:p>
-        </p:txBody>
-      </p:sp>
-      <p:sp>
-        <p:nvSpPr>
-          <p:cNvPr id="10" name="CaixaDeTexto 9"/>
-          <p:cNvSpPr txBox="1"/>
-          <p:nvPr/>
-        </p:nvSpPr>
-        <p:spPr>
-          <a:xfrm>
-            <a:off x="696686" y="1353425"/>
-            <a:ext cx="1150315" cy="369332"/>
-          </a:xfrm>
-          <a:prstGeom prst="rect">
-            <a:avLst/>
-          </a:prstGeom>
-          <a:noFill/>
-        </p:spPr>
-        <p:txBody>
-          <a:bodyPr wrap="none" rtlCol="0">
-            <a:spAutoFit/>
-          </a:bodyPr>
-          <a:lstStyle/>
-          <a:p>
-            <a:r>
-              <a:rPr lang="pt-BR" b="1" dirty="0" smtClean="0"/>
-              <a:t>Aparelhos</a:t>
-            </a:r>
-            <a:endParaRPr lang="pt-BR" b="1" dirty="0"/>
-          </a:p>
-        </p:txBody>
-      </p:sp>
-      <p:sp>
-        <p:nvSpPr>
-          <p:cNvPr id="11" name="Retângulo 10"/>
-          <p:cNvSpPr/>
-          <p:nvPr/>
-        </p:nvSpPr>
-        <p:spPr>
-          <a:xfrm>
-            <a:off x="700224" y="3501496"/>
-            <a:ext cx="1143818" cy="1554598"/>
-          </a:xfrm>
-          <a:prstGeom prst="rect">
-            <a:avLst/>
-          </a:prstGeom>
-          <a:noFill/>
-          <a:ln>
-            <a:solidFill>
-              <a:schemeClr val="tx1"/>
-            </a:solidFill>
-          </a:ln>
-        </p:spPr>
-        <p:style>
-          <a:lnRef idx="2">
-            <a:schemeClr val="accent1">
-              <a:shade val="50000"/>
-            </a:schemeClr>
-          </a:lnRef>
-          <a:fillRef idx="1">
-            <a:schemeClr val="accent1"/>
-          </a:fillRef>
-          <a:effectRef idx="0">
-            <a:schemeClr val="accent1"/>
-          </a:effectRef>
-          <a:fontRef idx="minor">
-            <a:schemeClr val="lt1"/>
-          </a:fontRef>
-        </p:style>
-        <p:txBody>
-          <a:bodyPr rtlCol="0" anchor="ctr"/>
-          <a:lstStyle/>
-          <a:p>
-            <a:pPr algn="ctr"/>
-            <a:endParaRPr lang="pt-BR"/>
-          </a:p>
-        </p:txBody>
-      </p:sp>
-      <p:sp>
-        <p:nvSpPr>
-          <p:cNvPr id="12" name="Retângulo 11"/>
-          <p:cNvSpPr/>
-          <p:nvPr/>
-        </p:nvSpPr>
-        <p:spPr>
-          <a:xfrm>
-            <a:off x="696686" y="1892903"/>
-            <a:ext cx="1147660" cy="1453021"/>
-          </a:xfrm>
-          <a:prstGeom prst="rect">
-            <a:avLst/>
-          </a:prstGeom>
-          <a:noFill/>
-          <a:ln>
-            <a:solidFill>
-              <a:schemeClr val="tx1"/>
-            </a:solidFill>
-          </a:ln>
-        </p:spPr>
-        <p:style>
-          <a:lnRef idx="2">
-            <a:schemeClr val="accent1">
-              <a:shade val="50000"/>
-            </a:schemeClr>
-          </a:lnRef>
-          <a:fillRef idx="1">
-            <a:schemeClr val="accent1"/>
-          </a:fillRef>
-          <a:effectRef idx="0">
-            <a:schemeClr val="accent1"/>
-          </a:effectRef>
-          <a:fontRef idx="minor">
-            <a:schemeClr val="lt1"/>
-          </a:fontRef>
-        </p:style>
-        <p:txBody>
-          <a:bodyPr rtlCol="0" anchor="ctr"/>
-          <a:lstStyle/>
-          <a:p>
-            <a:pPr algn="ctr"/>
-            <a:endParaRPr lang="pt-BR"/>
-          </a:p>
-        </p:txBody>
-      </p:sp>
       <p:cxnSp>
         <p:nvCxnSpPr>
-          <p:cNvPr id="14" name="Conector de Seta Reta 13"/>
+          <p:cNvPr id="27" name="Conector em Curva 26"/>
           <p:cNvCxnSpPr/>
           <p:nvPr/>
         </p:nvCxnSpPr>
         <p:spPr>
-          <a:xfrm>
-            <a:off x="4036423" y="3642675"/>
-            <a:ext cx="535577" cy="0"/>
-          </a:xfrm>
-          <a:prstGeom prst="straightConnector1">
+          <a:xfrm flipV="1">
+            <a:off x="7965830" y="1892254"/>
+            <a:ext cx="1310251" cy="1292222"/>
+          </a:xfrm>
+          <a:prstGeom prst="curvedConnector3">
             <a:avLst/>
           </a:prstGeom>
           <a:ln>
@@ -3352,7 +3256,7 @@
       </p:cxnSp>
       <p:pic>
         <p:nvPicPr>
-          <p:cNvPr id="18" name="Imagem 17"/>
+          <p:cNvPr id="28" name="Imagem 27"/>
           <p:cNvPicPr>
             <a:picLocks noChangeAspect="1"/>
           </p:cNvPicPr>
@@ -3372,138 +3276,6 @@
         </p:blipFill>
         <p:spPr>
           <a:xfrm>
-            <a:off x="4986158" y="3394380"/>
-            <a:ext cx="609295" cy="609295"/>
-          </a:xfrm>
-          <a:prstGeom prst="rect">
-            <a:avLst/>
-          </a:prstGeom>
-        </p:spPr>
-      </p:pic>
-      <p:cxnSp>
-        <p:nvCxnSpPr>
-          <p:cNvPr id="20" name="Conector de Seta Reta 19"/>
-          <p:cNvCxnSpPr/>
-          <p:nvPr/>
-        </p:nvCxnSpPr>
-        <p:spPr>
-          <a:xfrm>
-            <a:off x="5956663" y="3642675"/>
-            <a:ext cx="535577" cy="0"/>
-          </a:xfrm>
-          <a:prstGeom prst="straightConnector1">
-            <a:avLst/>
-          </a:prstGeom>
-          <a:ln>
-            <a:solidFill>
-              <a:schemeClr val="tx1"/>
-            </a:solidFill>
-            <a:tailEnd type="triangle"/>
-          </a:ln>
-        </p:spPr>
-        <p:style>
-          <a:lnRef idx="1">
-            <a:schemeClr val="accent1"/>
-          </a:lnRef>
-          <a:fillRef idx="0">
-            <a:schemeClr val="accent1"/>
-          </a:fillRef>
-          <a:effectRef idx="0">
-            <a:schemeClr val="accent1"/>
-          </a:effectRef>
-          <a:fontRef idx="minor">
-            <a:schemeClr val="tx1"/>
-          </a:fontRef>
-        </p:style>
-      </p:cxnSp>
-      <p:pic>
-        <p:nvPicPr>
-          <p:cNvPr id="21" name="Imagem 20"/>
-          <p:cNvPicPr>
-            <a:picLocks noChangeAspect="1"/>
-          </p:cNvPicPr>
-          <p:nvPr/>
-        </p:nvPicPr>
-        <p:blipFill>
-          <a:blip r:embed="rId6">
-            <a:extLst>
-              <a:ext uri="{28A0092B-C50C-407E-A947-70E740481C1C}">
-                <a14:useLocalDpi xmlns:a14="http://schemas.microsoft.com/office/drawing/2010/main" val="0"/>
-              </a:ext>
-            </a:extLst>
-          </a:blip>
-          <a:stretch>
-            <a:fillRect/>
-          </a:stretch>
-        </p:blipFill>
-        <p:spPr>
-          <a:xfrm>
-            <a:off x="6778691" y="3116142"/>
-            <a:ext cx="1187139" cy="1187139"/>
-          </a:xfrm>
-          <a:prstGeom prst="rect">
-            <a:avLst/>
-          </a:prstGeom>
-        </p:spPr>
-      </p:pic>
-      <p:cxnSp>
-        <p:nvCxnSpPr>
-          <p:cNvPr id="27" name="Conector em Curva 26"/>
-          <p:cNvCxnSpPr/>
-          <p:nvPr/>
-        </p:nvCxnSpPr>
-        <p:spPr>
-          <a:xfrm flipV="1">
-            <a:off x="7965830" y="1892254"/>
-            <a:ext cx="1310251" cy="1292222"/>
-          </a:xfrm>
-          <a:prstGeom prst="curvedConnector3">
-            <a:avLst/>
-          </a:prstGeom>
-          <a:ln>
-            <a:solidFill>
-              <a:schemeClr val="tx1"/>
-            </a:solidFill>
-            <a:tailEnd type="triangle"/>
-          </a:ln>
-        </p:spPr>
-        <p:style>
-          <a:lnRef idx="1">
-            <a:schemeClr val="accent1"/>
-          </a:lnRef>
-          <a:fillRef idx="0">
-            <a:schemeClr val="accent1"/>
-          </a:fillRef>
-          <a:effectRef idx="0">
-            <a:schemeClr val="accent1"/>
-          </a:effectRef>
-          <a:fontRef idx="minor">
-            <a:schemeClr val="tx1"/>
-          </a:fontRef>
-        </p:style>
-      </p:cxnSp>
-      <p:pic>
-        <p:nvPicPr>
-          <p:cNvPr id="28" name="Imagem 27"/>
-          <p:cNvPicPr>
-            <a:picLocks noChangeAspect="1"/>
-          </p:cNvPicPr>
-          <p:nvPr/>
-        </p:nvPicPr>
-        <p:blipFill>
-          <a:blip r:embed="rId7">
-            <a:extLst>
-              <a:ext uri="{28A0092B-C50C-407E-A947-70E740481C1C}">
-                <a14:useLocalDpi xmlns:a14="http://schemas.microsoft.com/office/drawing/2010/main" val="0"/>
-              </a:ext>
-            </a:extLst>
-          </a:blip>
-          <a:stretch>
-            <a:fillRect/>
-          </a:stretch>
-        </p:blipFill>
-        <p:spPr>
-          <a:xfrm>
             <a:off x="9560011" y="1327703"/>
             <a:ext cx="903209" cy="903209"/>
           </a:xfrm>
@@ -3557,7 +3329,7 @@
           <p:nvPr/>
         </p:nvPicPr>
         <p:blipFill>
-          <a:blip r:embed="rId7">
+          <a:blip r:embed="rId5">
             <a:extLst>
               <a:ext uri="{28A0092B-C50C-407E-A947-70E740481C1C}">
                 <a14:useLocalDpi xmlns:a14="http://schemas.microsoft.com/office/drawing/2010/main" val="0"/>
@@ -3586,8 +3358,8 @@
         </p:nvSpPr>
         <p:spPr>
           <a:xfrm>
-            <a:off x="363690" y="5781818"/>
-            <a:ext cx="2101485" cy="461665"/>
+            <a:off x="201645" y="5781818"/>
+            <a:ext cx="2240613" cy="830997"/>
           </a:xfrm>
           <a:prstGeom prst="rect">
             <a:avLst/>
@@ -3607,10 +3379,9 @@
           <a:p>
             <a:pPr algn="ctr"/>
             <a:r>
-              <a:rPr lang="pt-BR" sz="1200" dirty="0" smtClean="0"/>
-              <a:t>As informações são captadas através de sensores </a:t>
-            </a:r>
-            <a:endParaRPr lang="pt-BR" sz="1200" dirty="0"/>
+              <a:rPr lang="pt-BR" sz="1200" dirty="0"/>
+              <a:t>As informações são captadas através do sensor de proximidade, que aumenta a intensidade da fonte de luz</a:t>
+            </a:r>
           </a:p>
         </p:txBody>
       </p:sp>
@@ -3658,8 +3429,8 @@
         </p:nvCxnSpPr>
         <p:spPr>
           <a:xfrm>
-            <a:off x="2137561" y="3668660"/>
-            <a:ext cx="655228" cy="0"/>
+            <a:off x="2438400" y="3668110"/>
+            <a:ext cx="459493" cy="550"/>
           </a:xfrm>
           <a:prstGeom prst="straightConnector1">
             <a:avLst/>
@@ -3710,10 +3481,9 @@
           <a:p>
             <a:pPr algn="ctr"/>
             <a:r>
-              <a:rPr lang="pt-BR" sz="1200" dirty="0" smtClean="0"/>
-              <a:t>Os sensores são conectados ao roteador que fornece a conexão  com o Wi-Fi</a:t>
-            </a:r>
-            <a:endParaRPr lang="pt-BR" sz="1200" dirty="0"/>
+              <a:rPr lang="pt-BR" sz="1200" dirty="0"/>
+              <a:t>O sensor é conectado ao roteador que fornece a conexão  com o Wi-Fi</a:t>
+            </a:r>
           </a:p>
         </p:txBody>
       </p:sp>
@@ -3859,10 +3629,9 @@
           <a:p>
             <a:pPr algn="ctr"/>
             <a:r>
-              <a:rPr lang="pt-BR" sz="1200" dirty="0" smtClean="0"/>
+              <a:rPr lang="pt-BR" sz="1200" dirty="0"/>
               <a:t>As informações obtidas são armazenadas na Nuvem</a:t>
             </a:r>
-            <a:endParaRPr lang="pt-BR" sz="1200" dirty="0"/>
           </a:p>
         </p:txBody>
       </p:sp>
@@ -4020,10 +3789,9 @@
           <a:p>
             <a:pPr algn="ctr"/>
             <a:r>
-              <a:rPr lang="pt-BR" sz="1200" dirty="0" smtClean="0"/>
+              <a:rPr lang="pt-BR" sz="1200" dirty="0"/>
               <a:t>O administrador recebe acesso a essas informações  através de uma plataforma Web</a:t>
             </a:r>
-            <a:endParaRPr lang="pt-BR" sz="1200" dirty="0"/>
           </a:p>
         </p:txBody>
       </p:sp>
@@ -4099,10 +3867,9 @@
           <a:p>
             <a:pPr algn="ctr"/>
             <a:r>
-              <a:rPr lang="pt-BR" sz="1200" dirty="0" smtClean="0"/>
-              <a:t>Demais funcionários recebe acesso simultâneo  </a:t>
-            </a:r>
-            <a:endParaRPr lang="pt-BR" sz="1200" dirty="0"/>
+              <a:rPr lang="pt-BR" sz="1200" dirty="0"/>
+              <a:t>Demais usuários recebem acesso simultâneo  </a:t>
+            </a:r>
           </a:p>
         </p:txBody>
       </p:sp>
@@ -4114,8 +3881,8 @@
         </p:nvSpPr>
         <p:spPr>
           <a:xfrm>
-            <a:off x="2286000" y="378823"/>
-            <a:ext cx="6334955" cy="1077218"/>
+            <a:off x="4398579" y="210658"/>
+            <a:ext cx="7793421" cy="584775"/>
           </a:xfrm>
           <a:prstGeom prst="rect">
             <a:avLst/>
@@ -4130,17 +3897,248 @@
           <a:p>
             <a:pPr algn="ctr"/>
             <a:r>
-              <a:rPr lang="pt-BR" sz="3200" dirty="0" smtClean="0">
+              <a:rPr lang="pt-BR" sz="3200" dirty="0">
                 <a:latin typeface="Arial Black" panose="020B0A04020102020204" pitchFamily="34" charset="0"/>
               </a:rPr>
               <a:t>Solução de Negócio - TecShine </a:t>
             </a:r>
-            <a:endParaRPr lang="pt-BR" sz="3200" dirty="0">
-              <a:latin typeface="Arial Black" panose="020B0A04020102020204" pitchFamily="34" charset="0"/>
-            </a:endParaRPr>
-          </a:p>
-        </p:txBody>
-      </p:sp>
+          </a:p>
+        </p:txBody>
+      </p:sp>
+      <p:pic>
+        <p:nvPicPr>
+          <p:cNvPr id="44" name="Imagem 43"/>
+          <p:cNvPicPr>
+            <a:picLocks noChangeAspect="1"/>
+          </p:cNvPicPr>
+          <p:nvPr/>
+        </p:nvPicPr>
+        <p:blipFill>
+          <a:blip r:embed="rId6"/>
+          <a:stretch>
+            <a:fillRect/>
+          </a:stretch>
+        </p:blipFill>
+        <p:spPr>
+          <a:xfrm>
+            <a:off x="415815" y="4087057"/>
+            <a:ext cx="831784" cy="831784"/>
+          </a:xfrm>
+          <a:prstGeom prst="rect">
+            <a:avLst/>
+          </a:prstGeom>
+        </p:spPr>
+      </p:pic>
+      <p:pic>
+        <p:nvPicPr>
+          <p:cNvPr id="45" name="Imagem 44"/>
+          <p:cNvPicPr>
+            <a:picLocks noChangeAspect="1"/>
+          </p:cNvPicPr>
+          <p:nvPr/>
+        </p:nvPicPr>
+        <p:blipFill>
+          <a:blip r:embed="rId7" cstate="print"/>
+          <a:stretch>
+            <a:fillRect/>
+          </a:stretch>
+        </p:blipFill>
+        <p:spPr>
+          <a:xfrm>
+            <a:off x="954232" y="2125402"/>
+            <a:ext cx="970114" cy="1111783"/>
+          </a:xfrm>
+          <a:prstGeom prst="rect">
+            <a:avLst/>
+          </a:prstGeom>
+        </p:spPr>
+      </p:pic>
+      <p:sp>
+        <p:nvSpPr>
+          <p:cNvPr id="47" name="Retângulo 46"/>
+          <p:cNvSpPr/>
+          <p:nvPr/>
+        </p:nvSpPr>
+        <p:spPr>
+          <a:xfrm>
+            <a:off x="367862" y="1892903"/>
+            <a:ext cx="1839310" cy="1453021"/>
+          </a:xfrm>
+          <a:prstGeom prst="rect">
+            <a:avLst/>
+          </a:prstGeom>
+          <a:noFill/>
+          <a:ln>
+            <a:solidFill>
+              <a:schemeClr val="tx1"/>
+            </a:solidFill>
+          </a:ln>
+        </p:spPr>
+        <p:style>
+          <a:lnRef idx="2">
+            <a:schemeClr val="accent1">
+              <a:shade val="50000"/>
+            </a:schemeClr>
+          </a:lnRef>
+          <a:fillRef idx="1">
+            <a:schemeClr val="accent1"/>
+          </a:fillRef>
+          <a:effectRef idx="0">
+            <a:schemeClr val="accent1"/>
+          </a:effectRef>
+          <a:fontRef idx="minor">
+            <a:schemeClr val="lt1"/>
+          </a:fontRef>
+        </p:style>
+        <p:txBody>
+          <a:bodyPr rtlCol="0" anchor="ctr"/>
+          <a:lstStyle/>
+          <a:p>
+            <a:pPr algn="ctr"/>
+            <a:endParaRPr lang="pt-BR"/>
+          </a:p>
+        </p:txBody>
+      </p:sp>
+      <p:pic>
+        <p:nvPicPr>
+          <p:cNvPr id="51" name="Imagem 50"/>
+          <p:cNvPicPr>
+            <a:picLocks noChangeAspect="1"/>
+          </p:cNvPicPr>
+          <p:nvPr/>
+        </p:nvPicPr>
+        <p:blipFill>
+          <a:blip r:embed="rId7" cstate="print"/>
+          <a:stretch>
+            <a:fillRect/>
+          </a:stretch>
+        </p:blipFill>
+        <p:spPr>
+          <a:xfrm>
+            <a:off x="938466" y="3812313"/>
+            <a:ext cx="970114" cy="1111783"/>
+          </a:xfrm>
+          <a:prstGeom prst="rect">
+            <a:avLst/>
+          </a:prstGeom>
+        </p:spPr>
+      </p:pic>
+      <p:sp>
+        <p:nvSpPr>
+          <p:cNvPr id="52" name="Retângulo 51"/>
+          <p:cNvSpPr/>
+          <p:nvPr/>
+        </p:nvSpPr>
+        <p:spPr>
+          <a:xfrm>
+            <a:off x="352096" y="3579814"/>
+            <a:ext cx="1839310" cy="1453021"/>
+          </a:xfrm>
+          <a:prstGeom prst="rect">
+            <a:avLst/>
+          </a:prstGeom>
+          <a:noFill/>
+          <a:ln>
+            <a:solidFill>
+              <a:schemeClr val="tx1"/>
+            </a:solidFill>
+          </a:ln>
+        </p:spPr>
+        <p:style>
+          <a:lnRef idx="2">
+            <a:schemeClr val="accent1">
+              <a:shade val="50000"/>
+            </a:schemeClr>
+          </a:lnRef>
+          <a:fillRef idx="1">
+            <a:schemeClr val="accent1"/>
+          </a:fillRef>
+          <a:effectRef idx="0">
+            <a:schemeClr val="accent1"/>
+          </a:effectRef>
+          <a:fontRef idx="minor">
+            <a:schemeClr val="lt1"/>
+          </a:fontRef>
+        </p:style>
+        <p:txBody>
+          <a:bodyPr rtlCol="0" anchor="ctr"/>
+          <a:lstStyle/>
+          <a:p>
+            <a:pPr algn="ctr"/>
+            <a:endParaRPr lang="pt-BR"/>
+          </a:p>
+        </p:txBody>
+      </p:sp>
+      <p:sp>
+        <p:nvSpPr>
+          <p:cNvPr id="57" name="CaixaDeTexto 56"/>
+          <p:cNvSpPr txBox="1"/>
+          <p:nvPr/>
+        </p:nvSpPr>
+        <p:spPr>
+          <a:xfrm>
+            <a:off x="190270" y="395267"/>
+            <a:ext cx="2437317" cy="830997"/>
+          </a:xfrm>
+          <a:prstGeom prst="rect">
+            <a:avLst/>
+          </a:prstGeom>
+          <a:noFill/>
+          <a:ln>
+            <a:solidFill>
+              <a:schemeClr val="tx1"/>
+            </a:solidFill>
+          </a:ln>
+        </p:spPr>
+        <p:txBody>
+          <a:bodyPr wrap="square" rtlCol="0">
+            <a:spAutoFit/>
+          </a:bodyPr>
+          <a:lstStyle/>
+          <a:p>
+            <a:r>
+              <a:rPr lang="pt-BR" sz="1200" dirty="0"/>
+              <a:t>Enquanto não há movimento no ambiente, a fonte de luz permanece na intensidade pré-definida pelo administrador</a:t>
+            </a:r>
+          </a:p>
+        </p:txBody>
+      </p:sp>
+      <p:cxnSp>
+        <p:nvCxnSpPr>
+          <p:cNvPr id="70" name="Conector de Seta Reta 65"/>
+          <p:cNvCxnSpPr/>
+          <p:nvPr/>
+        </p:nvCxnSpPr>
+        <p:spPr>
+          <a:xfrm flipV="1">
+            <a:off x="1264536" y="1275870"/>
+            <a:ext cx="0" cy="412208"/>
+          </a:xfrm>
+          <a:prstGeom prst="straightConnector1">
+            <a:avLst/>
+          </a:prstGeom>
+          <a:ln>
+            <a:solidFill>
+              <a:schemeClr val="tx1"/>
+            </a:solidFill>
+            <a:tailEnd type="triangle"/>
+          </a:ln>
+        </p:spPr>
+        <p:style>
+          <a:lnRef idx="1">
+            <a:schemeClr val="accent1"/>
+          </a:lnRef>
+          <a:fillRef idx="0">
+            <a:schemeClr val="accent1"/>
+          </a:fillRef>
+          <a:effectRef idx="0">
+            <a:schemeClr val="accent1"/>
+          </a:effectRef>
+          <a:fontRef idx="minor">
+            <a:schemeClr val="tx1"/>
+          </a:fontRef>
+        </p:style>
+      </p:cxnSp>
     </p:spTree>
     <p:extLst>
       <p:ext uri="{BB962C8B-B14F-4D97-AF65-F5344CB8AC3E}">
@@ -4151,13 +4149,6 @@
   <p:clrMapOvr>
     <a:masterClrMapping/>
   </p:clrMapOvr>
-  <p:timing>
-    <p:tnLst>
-      <p:par>
-        <p:cTn id="1" dur="indefinite" restart="never" nodeType="tmRoot"/>
-      </p:par>
-    </p:tnLst>
-  </p:timing>
 </p:sld>
 </file>
 
@@ -4180,36 +4171,6 @@
       </p:grpSpPr>
       <p:sp>
         <p:nvSpPr>
-          <p:cNvPr id="2" name="Título 1"/>
-          <p:cNvSpPr>
-            <a:spLocks noGrp="1"/>
-          </p:cNvSpPr>
-          <p:nvPr>
-            <p:ph type="ctrTitle"/>
-          </p:nvPr>
-        </p:nvSpPr>
-        <p:spPr>
-          <a:xfrm>
-            <a:off x="682518" y="2991162"/>
-            <a:ext cx="1145176" cy="374877"/>
-          </a:xfrm>
-        </p:spPr>
-        <p:txBody>
-          <a:bodyPr>
-            <a:normAutofit fontScale="90000"/>
-          </a:bodyPr>
-          <a:lstStyle/>
-          <a:p>
-            <a:r>
-              <a:rPr lang="pt-BR" sz="1100" b="1" dirty="0" smtClean="0"/>
-              <a:t>Sensor de Proximidade</a:t>
-            </a:r>
-            <a:endParaRPr lang="pt-BR" sz="1100" b="1" dirty="0"/>
-          </a:p>
-        </p:txBody>
-      </p:sp>
-      <p:sp>
-        <p:nvSpPr>
           <p:cNvPr id="3" name="Subtítulo 2"/>
           <p:cNvSpPr>
             <a:spLocks noGrp="1"/>
@@ -4256,63 +4217,17 @@
         </p:blipFill>
         <p:spPr>
           <a:xfrm>
-            <a:off x="3056652" y="3427923"/>
-            <a:ext cx="563575" cy="563575"/>
+            <a:off x="2960713" y="3344293"/>
+            <a:ext cx="551320" cy="551320"/>
           </a:xfrm>
           <a:prstGeom prst="rect">
             <a:avLst/>
           </a:prstGeom>
         </p:spPr>
       </p:pic>
-      <p:sp>
-        <p:nvSpPr>
-          <p:cNvPr id="5" name="Retângulo 4"/>
-          <p:cNvSpPr/>
-          <p:nvPr/>
-        </p:nvSpPr>
-        <p:spPr>
-          <a:xfrm>
-            <a:off x="571022" y="1780938"/>
-            <a:ext cx="1384663" cy="3402875"/>
-          </a:xfrm>
-          <a:prstGeom prst="rect">
-            <a:avLst/>
-          </a:prstGeom>
-          <a:noFill/>
-          <a:ln>
-            <a:solidFill>
-              <a:schemeClr val="tx1"/>
-            </a:solidFill>
-          </a:ln>
-        </p:spPr>
-        <p:style>
-          <a:lnRef idx="2">
-            <a:schemeClr val="accent1">
-              <a:shade val="50000"/>
-            </a:schemeClr>
-          </a:lnRef>
-          <a:fillRef idx="1">
-            <a:schemeClr val="accent1"/>
-          </a:fillRef>
-          <a:effectRef idx="0">
-            <a:schemeClr val="accent1"/>
-          </a:effectRef>
-          <a:fontRef idx="minor">
-            <a:schemeClr val="lt1"/>
-          </a:fontRef>
-        </p:style>
-        <p:txBody>
-          <a:bodyPr rtlCol="0" anchor="ctr"/>
-          <a:lstStyle/>
-          <a:p>
-            <a:pPr algn="ctr"/>
-            <a:endParaRPr lang="pt-BR"/>
-          </a:p>
-        </p:txBody>
-      </p:sp>
       <p:pic>
         <p:nvPicPr>
-          <p:cNvPr id="7" name="Imagem 6"/>
+          <p:cNvPr id="18" name="Imagem 17"/>
           <p:cNvPicPr>
             <a:picLocks noChangeAspect="1"/>
           </p:cNvPicPr>
@@ -4332,17 +4247,53 @@
         </p:blipFill>
         <p:spPr>
           <a:xfrm>
-            <a:off x="785165" y="3619953"/>
-            <a:ext cx="978100" cy="978100"/>
+            <a:off x="4273348" y="3348700"/>
+            <a:ext cx="572706" cy="572706"/>
           </a:xfrm>
           <a:prstGeom prst="rect">
             <a:avLst/>
           </a:prstGeom>
         </p:spPr>
       </p:pic>
+      <p:cxnSp>
+        <p:nvCxnSpPr>
+          <p:cNvPr id="20" name="Conector de Seta Reta 19"/>
+          <p:cNvCxnSpPr/>
+          <p:nvPr/>
+        </p:nvCxnSpPr>
+        <p:spPr>
+          <a:xfrm>
+            <a:off x="5007924" y="3657885"/>
+            <a:ext cx="535577" cy="0"/>
+          </a:xfrm>
+          <a:prstGeom prst="straightConnector1">
+            <a:avLst/>
+          </a:prstGeom>
+          <a:ln>
+            <a:solidFill>
+              <a:schemeClr val="tx1"/>
+            </a:solidFill>
+            <a:tailEnd type="triangle"/>
+          </a:ln>
+        </p:spPr>
+        <p:style>
+          <a:lnRef idx="1">
+            <a:schemeClr val="accent1"/>
+          </a:lnRef>
+          <a:fillRef idx="0">
+            <a:schemeClr val="accent1"/>
+          </a:fillRef>
+          <a:effectRef idx="0">
+            <a:schemeClr val="accent1"/>
+          </a:effectRef>
+          <a:fontRef idx="minor">
+            <a:schemeClr val="tx1"/>
+          </a:fontRef>
+        </p:style>
+      </p:cxnSp>
       <p:pic>
         <p:nvPicPr>
-          <p:cNvPr id="8" name="Imagem 7"/>
+          <p:cNvPr id="21" name="Imagem 20"/>
           <p:cNvPicPr>
             <a:picLocks noChangeAspect="1"/>
           </p:cNvPicPr>
@@ -4362,210 +4313,17 @@
         </p:blipFill>
         <p:spPr>
           <a:xfrm>
-            <a:off x="785165" y="1996294"/>
-            <a:ext cx="970701" cy="970701"/>
+            <a:off x="5649958" y="3177455"/>
+            <a:ext cx="1015408" cy="1015408"/>
           </a:xfrm>
           <a:prstGeom prst="rect">
             <a:avLst/>
           </a:prstGeom>
         </p:spPr>
       </p:pic>
-      <p:sp>
-        <p:nvSpPr>
-          <p:cNvPr id="9" name="CaixaDeTexto 8"/>
-          <p:cNvSpPr txBox="1"/>
-          <p:nvPr/>
-        </p:nvSpPr>
-        <p:spPr>
-          <a:xfrm>
-            <a:off x="851873" y="4617220"/>
-            <a:ext cx="822960" cy="430887"/>
-          </a:xfrm>
-          <a:prstGeom prst="rect">
-            <a:avLst/>
-          </a:prstGeom>
-          <a:noFill/>
-        </p:spPr>
-        <p:txBody>
-          <a:bodyPr wrap="square" rtlCol="0">
-            <a:spAutoFit/>
-          </a:bodyPr>
-          <a:lstStyle/>
-          <a:p>
-            <a:pPr algn="ctr"/>
-            <a:r>
-              <a:rPr lang="pt-BR" sz="1100" b="1" dirty="0" smtClean="0">
-                <a:latin typeface="+mj-lt"/>
-              </a:rPr>
-              <a:t>Sensor de Iluminação</a:t>
-            </a:r>
-            <a:endParaRPr lang="pt-BR" sz="1100" b="1" dirty="0">
-              <a:latin typeface="+mj-lt"/>
-            </a:endParaRPr>
-          </a:p>
-        </p:txBody>
-      </p:sp>
-      <p:sp>
-        <p:nvSpPr>
-          <p:cNvPr id="10" name="CaixaDeTexto 9"/>
-          <p:cNvSpPr txBox="1"/>
-          <p:nvPr/>
-        </p:nvSpPr>
-        <p:spPr>
-          <a:xfrm>
-            <a:off x="696686" y="1353425"/>
-            <a:ext cx="1150315" cy="369332"/>
-          </a:xfrm>
-          <a:prstGeom prst="rect">
-            <a:avLst/>
-          </a:prstGeom>
-          <a:noFill/>
-        </p:spPr>
-        <p:txBody>
-          <a:bodyPr wrap="none" rtlCol="0">
-            <a:spAutoFit/>
-          </a:bodyPr>
-          <a:lstStyle/>
-          <a:p>
-            <a:r>
-              <a:rPr lang="pt-BR" b="1" dirty="0" smtClean="0"/>
-              <a:t>Aparelhos</a:t>
-            </a:r>
-            <a:endParaRPr lang="pt-BR" b="1" dirty="0"/>
-          </a:p>
-        </p:txBody>
-      </p:sp>
-      <p:sp>
-        <p:nvSpPr>
-          <p:cNvPr id="11" name="Retângulo 10"/>
-          <p:cNvSpPr/>
-          <p:nvPr/>
-        </p:nvSpPr>
-        <p:spPr>
-          <a:xfrm>
-            <a:off x="700224" y="3501496"/>
-            <a:ext cx="1143818" cy="1554598"/>
-          </a:xfrm>
-          <a:prstGeom prst="rect">
-            <a:avLst/>
-          </a:prstGeom>
-          <a:noFill/>
-          <a:ln>
-            <a:solidFill>
-              <a:schemeClr val="tx1"/>
-            </a:solidFill>
-          </a:ln>
-        </p:spPr>
-        <p:style>
-          <a:lnRef idx="2">
-            <a:schemeClr val="accent1">
-              <a:shade val="50000"/>
-            </a:schemeClr>
-          </a:lnRef>
-          <a:fillRef idx="1">
-            <a:schemeClr val="accent1"/>
-          </a:fillRef>
-          <a:effectRef idx="0">
-            <a:schemeClr val="accent1"/>
-          </a:effectRef>
-          <a:fontRef idx="minor">
-            <a:schemeClr val="lt1"/>
-          </a:fontRef>
-        </p:style>
-        <p:txBody>
-          <a:bodyPr rtlCol="0" anchor="ctr"/>
-          <a:lstStyle/>
-          <a:p>
-            <a:pPr algn="ctr"/>
-            <a:endParaRPr lang="pt-BR"/>
-          </a:p>
-        </p:txBody>
-      </p:sp>
-      <p:sp>
-        <p:nvSpPr>
-          <p:cNvPr id="12" name="Retângulo 11"/>
-          <p:cNvSpPr/>
-          <p:nvPr/>
-        </p:nvSpPr>
-        <p:spPr>
-          <a:xfrm>
-            <a:off x="696686" y="1892903"/>
-            <a:ext cx="1147660" cy="1453021"/>
-          </a:xfrm>
-          <a:prstGeom prst="rect">
-            <a:avLst/>
-          </a:prstGeom>
-          <a:noFill/>
-          <a:ln>
-            <a:solidFill>
-              <a:schemeClr val="tx1"/>
-            </a:solidFill>
-          </a:ln>
-        </p:spPr>
-        <p:style>
-          <a:lnRef idx="2">
-            <a:schemeClr val="accent1">
-              <a:shade val="50000"/>
-            </a:schemeClr>
-          </a:lnRef>
-          <a:fillRef idx="1">
-            <a:schemeClr val="accent1"/>
-          </a:fillRef>
-          <a:effectRef idx="0">
-            <a:schemeClr val="accent1"/>
-          </a:effectRef>
-          <a:fontRef idx="minor">
-            <a:schemeClr val="lt1"/>
-          </a:fontRef>
-        </p:style>
-        <p:txBody>
-          <a:bodyPr rtlCol="0" anchor="ctr"/>
-          <a:lstStyle/>
-          <a:p>
-            <a:pPr algn="ctr"/>
-            <a:endParaRPr lang="pt-BR"/>
-          </a:p>
-        </p:txBody>
-      </p:sp>
-      <p:cxnSp>
-        <p:nvCxnSpPr>
-          <p:cNvPr id="14" name="Conector de Seta Reta 13"/>
-          <p:cNvCxnSpPr/>
-          <p:nvPr/>
-        </p:nvCxnSpPr>
-        <p:spPr>
-          <a:xfrm>
-            <a:off x="4036423" y="3642675"/>
-            <a:ext cx="535577" cy="0"/>
-          </a:xfrm>
-          <a:prstGeom prst="straightConnector1">
-            <a:avLst/>
-          </a:prstGeom>
-          <a:ln>
-            <a:solidFill>
-              <a:schemeClr val="tx1"/>
-            </a:solidFill>
-            <a:tailEnd type="triangle"/>
-          </a:ln>
-        </p:spPr>
-        <p:style>
-          <a:lnRef idx="1">
-            <a:schemeClr val="accent1"/>
-          </a:lnRef>
-          <a:fillRef idx="0">
-            <a:schemeClr val="accent1"/>
-          </a:fillRef>
-          <a:effectRef idx="0">
-            <a:schemeClr val="accent1"/>
-          </a:effectRef>
-          <a:fontRef idx="minor">
-            <a:schemeClr val="tx1"/>
-          </a:fontRef>
-        </p:style>
-      </p:cxnSp>
       <p:pic>
         <p:nvPicPr>
-          <p:cNvPr id="18" name="Imagem 17"/>
+          <p:cNvPr id="28" name="Imagem 27"/>
           <p:cNvPicPr>
             <a:picLocks noChangeAspect="1"/>
           </p:cNvPicPr>
@@ -4585,8 +4343,8 @@
         </p:blipFill>
         <p:spPr>
           <a:xfrm>
-            <a:off x="4986158" y="3394380"/>
-            <a:ext cx="609295" cy="609295"/>
+            <a:off x="10312140" y="3010695"/>
+            <a:ext cx="903209" cy="903209"/>
           </a:xfrm>
           <a:prstGeom prst="rect">
             <a:avLst/>
@@ -4595,14 +4353,775 @@
       </p:pic>
       <p:cxnSp>
         <p:nvCxnSpPr>
-          <p:cNvPr id="20" name="Conector de Seta Reta 19"/>
+          <p:cNvPr id="48" name="Conector de Seta Reta 47"/>
+          <p:cNvCxnSpPr>
+            <a:cxnSpLocks/>
+          </p:cNvCxnSpPr>
+          <p:nvPr/>
+        </p:nvCxnSpPr>
+        <p:spPr>
+          <a:xfrm>
+            <a:off x="1281221" y="5290460"/>
+            <a:ext cx="0" cy="433161"/>
+          </a:xfrm>
+          <a:prstGeom prst="straightConnector1">
+            <a:avLst/>
+          </a:prstGeom>
+          <a:ln>
+            <a:solidFill>
+              <a:schemeClr val="tx1"/>
+            </a:solidFill>
+            <a:tailEnd type="triangle"/>
+          </a:ln>
+        </p:spPr>
+        <p:style>
+          <a:lnRef idx="1">
+            <a:schemeClr val="accent1"/>
+          </a:lnRef>
+          <a:fillRef idx="0">
+            <a:schemeClr val="accent1"/>
+          </a:fillRef>
+          <a:effectRef idx="0">
+            <a:schemeClr val="accent1"/>
+          </a:effectRef>
+          <a:fontRef idx="minor">
+            <a:schemeClr val="tx1"/>
+          </a:fontRef>
+        </p:style>
+      </p:cxnSp>
+      <p:cxnSp>
+        <p:nvCxnSpPr>
+          <p:cNvPr id="55" name="Conector de Seta Reta 54"/>
+          <p:cNvCxnSpPr>
+            <a:cxnSpLocks/>
+          </p:cNvCxnSpPr>
+          <p:nvPr/>
+        </p:nvCxnSpPr>
+        <p:spPr>
+          <a:xfrm>
+            <a:off x="2375338" y="3667539"/>
+            <a:ext cx="492149" cy="0"/>
+          </a:xfrm>
+          <a:prstGeom prst="straightConnector1">
+            <a:avLst/>
+          </a:prstGeom>
+          <a:ln>
+            <a:solidFill>
+              <a:schemeClr val="tx1"/>
+            </a:solidFill>
+            <a:tailEnd type="triangle"/>
+          </a:ln>
+        </p:spPr>
+        <p:style>
+          <a:lnRef idx="1">
+            <a:schemeClr val="accent1"/>
+          </a:lnRef>
+          <a:fillRef idx="0">
+            <a:schemeClr val="accent1"/>
+          </a:fillRef>
+          <a:effectRef idx="0">
+            <a:schemeClr val="accent1"/>
+          </a:effectRef>
+          <a:fontRef idx="minor">
+            <a:schemeClr val="tx1"/>
+          </a:fontRef>
+        </p:style>
+      </p:cxnSp>
+      <p:sp>
+        <p:nvSpPr>
+          <p:cNvPr id="61" name="CaixaDeTexto 60"/>
+          <p:cNvSpPr txBox="1"/>
+          <p:nvPr/>
+        </p:nvSpPr>
+        <p:spPr>
+          <a:xfrm>
+            <a:off x="3044569" y="2168254"/>
+            <a:ext cx="1878148" cy="646331"/>
+          </a:xfrm>
+          <a:prstGeom prst="rect">
+            <a:avLst/>
+          </a:prstGeom>
+          <a:noFill/>
+        </p:spPr>
+        <p:txBody>
+          <a:bodyPr wrap="square" rtlCol="0">
+            <a:spAutoFit/>
+          </a:bodyPr>
+          <a:lstStyle/>
+          <a:p>
+            <a:pPr algn="ctr"/>
+            <a:r>
+              <a:rPr lang="pt-BR" sz="1200" dirty="0"/>
+              <a:t>Internet de fibra e Roteador de longo alcance recebem as informações </a:t>
+            </a:r>
+          </a:p>
+        </p:txBody>
+      </p:sp>
+      <p:sp>
+        <p:nvSpPr>
+          <p:cNvPr id="62" name="Retângulo 61"/>
+          <p:cNvSpPr/>
+          <p:nvPr/>
+        </p:nvSpPr>
+        <p:spPr>
+          <a:xfrm>
+            <a:off x="2955824" y="2104508"/>
+            <a:ext cx="2268512" cy="699364"/>
+          </a:xfrm>
+          <a:prstGeom prst="rect">
+            <a:avLst/>
+          </a:prstGeom>
+          <a:noFill/>
+          <a:ln>
+            <a:solidFill>
+              <a:schemeClr val="tx1"/>
+            </a:solidFill>
+          </a:ln>
+        </p:spPr>
+        <p:style>
+          <a:lnRef idx="2">
+            <a:schemeClr val="accent1">
+              <a:shade val="50000"/>
+            </a:schemeClr>
+          </a:lnRef>
+          <a:fillRef idx="1">
+            <a:schemeClr val="accent1"/>
+          </a:fillRef>
+          <a:effectRef idx="0">
+            <a:schemeClr val="accent1"/>
+          </a:effectRef>
+          <a:fontRef idx="minor">
+            <a:schemeClr val="lt1"/>
+          </a:fontRef>
+        </p:style>
+        <p:txBody>
+          <a:bodyPr rtlCol="0" anchor="ctr"/>
+          <a:lstStyle/>
+          <a:p>
+            <a:pPr algn="ctr"/>
+            <a:endParaRPr lang="pt-BR"/>
+          </a:p>
+        </p:txBody>
+      </p:sp>
+      <p:cxnSp>
+        <p:nvCxnSpPr>
+          <p:cNvPr id="68" name="Conector de Seta Reta 67"/>
+          <p:cNvCxnSpPr>
+            <a:cxnSpLocks/>
+          </p:cNvCxnSpPr>
+          <p:nvPr/>
+        </p:nvCxnSpPr>
+        <p:spPr>
+          <a:xfrm flipV="1">
+            <a:off x="4543922" y="2876542"/>
+            <a:ext cx="0" cy="348837"/>
+          </a:xfrm>
+          <a:prstGeom prst="straightConnector1">
+            <a:avLst/>
+          </a:prstGeom>
+          <a:ln>
+            <a:solidFill>
+              <a:schemeClr val="tx1"/>
+            </a:solidFill>
+            <a:tailEnd type="triangle"/>
+          </a:ln>
+        </p:spPr>
+        <p:style>
+          <a:lnRef idx="1">
+            <a:schemeClr val="accent1"/>
+          </a:lnRef>
+          <a:fillRef idx="0">
+            <a:schemeClr val="accent1"/>
+          </a:fillRef>
+          <a:effectRef idx="0">
+            <a:schemeClr val="accent1"/>
+          </a:effectRef>
+          <a:fontRef idx="minor">
+            <a:schemeClr val="tx1"/>
+          </a:fontRef>
+        </p:style>
+      </p:cxnSp>
+      <p:cxnSp>
+        <p:nvCxnSpPr>
+          <p:cNvPr id="84" name="Conector de Seta Reta 83"/>
           <p:cNvCxnSpPr/>
           <p:nvPr/>
         </p:nvCxnSpPr>
         <p:spPr>
           <a:xfrm>
-            <a:off x="5956663" y="3642675"/>
-            <a:ext cx="535577" cy="0"/>
+            <a:off x="5999705" y="4348113"/>
+            <a:ext cx="0" cy="305889"/>
+          </a:xfrm>
+          <a:prstGeom prst="straightConnector1">
+            <a:avLst/>
+          </a:prstGeom>
+          <a:ln>
+            <a:solidFill>
+              <a:schemeClr val="tx1"/>
+            </a:solidFill>
+            <a:tailEnd type="triangle"/>
+          </a:ln>
+        </p:spPr>
+        <p:style>
+          <a:lnRef idx="1">
+            <a:schemeClr val="accent1"/>
+          </a:lnRef>
+          <a:fillRef idx="0">
+            <a:schemeClr val="accent1"/>
+          </a:fillRef>
+          <a:effectRef idx="0">
+            <a:schemeClr val="accent1"/>
+          </a:effectRef>
+          <a:fontRef idx="minor">
+            <a:schemeClr val="tx1"/>
+          </a:fontRef>
+        </p:style>
+      </p:cxnSp>
+      <p:sp>
+        <p:nvSpPr>
+          <p:cNvPr id="90" name="CaixaDeTexto 89"/>
+          <p:cNvSpPr txBox="1"/>
+          <p:nvPr/>
+        </p:nvSpPr>
+        <p:spPr>
+          <a:xfrm>
+            <a:off x="4646125" y="243966"/>
+            <a:ext cx="8579922" cy="584775"/>
+          </a:xfrm>
+          <a:prstGeom prst="rect">
+            <a:avLst/>
+          </a:prstGeom>
+          <a:noFill/>
+        </p:spPr>
+        <p:txBody>
+          <a:bodyPr wrap="square" rtlCol="0">
+            <a:spAutoFit/>
+          </a:bodyPr>
+          <a:lstStyle/>
+          <a:p>
+            <a:pPr algn="ctr"/>
+            <a:r>
+              <a:rPr lang="pt-BR" sz="3200" dirty="0">
+                <a:latin typeface="Arial Black" panose="020B0A04020102020204" pitchFamily="34" charset="0"/>
+              </a:rPr>
+              <a:t>Solução Técnica - TecShine </a:t>
+            </a:r>
+          </a:p>
+        </p:txBody>
+      </p:sp>
+      <p:cxnSp>
+        <p:nvCxnSpPr>
+          <p:cNvPr id="13" name="Conector de Seta Reta 12"/>
+          <p:cNvCxnSpPr>
+            <a:cxnSpLocks/>
+          </p:cNvCxnSpPr>
+          <p:nvPr/>
+        </p:nvCxnSpPr>
+        <p:spPr>
+          <a:xfrm flipH="1">
+            <a:off x="6773663" y="3689122"/>
+            <a:ext cx="577049" cy="0"/>
+          </a:xfrm>
+          <a:prstGeom prst="straightConnector1">
+            <a:avLst/>
+          </a:prstGeom>
+          <a:ln>
+            <a:solidFill>
+              <a:schemeClr val="tx1"/>
+            </a:solidFill>
+            <a:tailEnd type="triangle"/>
+          </a:ln>
+        </p:spPr>
+        <p:style>
+          <a:lnRef idx="1">
+            <a:schemeClr val="accent1"/>
+          </a:lnRef>
+          <a:fillRef idx="0">
+            <a:schemeClr val="accent1"/>
+          </a:fillRef>
+          <a:effectRef idx="0">
+            <a:schemeClr val="accent1"/>
+          </a:effectRef>
+          <a:fontRef idx="minor">
+            <a:schemeClr val="tx1"/>
+          </a:fontRef>
+        </p:style>
+      </p:cxnSp>
+      <p:cxnSp>
+        <p:nvCxnSpPr>
+          <p:cNvPr id="16" name="Conector de Seta Reta 15"/>
+          <p:cNvCxnSpPr/>
+          <p:nvPr/>
+        </p:nvCxnSpPr>
+        <p:spPr>
+          <a:xfrm flipH="1" flipV="1">
+            <a:off x="10750893" y="2177632"/>
+            <a:ext cx="1" cy="657296"/>
+          </a:xfrm>
+          <a:prstGeom prst="straightConnector1">
+            <a:avLst/>
+          </a:prstGeom>
+          <a:ln>
+            <a:solidFill>
+              <a:schemeClr val="tx1"/>
+            </a:solidFill>
+            <a:tailEnd type="triangle"/>
+          </a:ln>
+        </p:spPr>
+        <p:style>
+          <a:lnRef idx="1">
+            <a:schemeClr val="accent1"/>
+          </a:lnRef>
+          <a:fillRef idx="0">
+            <a:schemeClr val="accent1"/>
+          </a:fillRef>
+          <a:effectRef idx="0">
+            <a:schemeClr val="accent1"/>
+          </a:effectRef>
+          <a:fontRef idx="minor">
+            <a:schemeClr val="tx1"/>
+          </a:fontRef>
+        </p:style>
+      </p:cxnSp>
+      <p:sp>
+        <p:nvSpPr>
+          <p:cNvPr id="22" name="CaixaDeTexto 21"/>
+          <p:cNvSpPr txBox="1"/>
+          <p:nvPr/>
+        </p:nvSpPr>
+        <p:spPr>
+          <a:xfrm>
+            <a:off x="3813517" y="4006216"/>
+            <a:ext cx="1362250" cy="642095"/>
+          </a:xfrm>
+          <a:prstGeom prst="rect">
+            <a:avLst/>
+          </a:prstGeom>
+          <a:noFill/>
+        </p:spPr>
+        <p:txBody>
+          <a:bodyPr wrap="square" rtlCol="0">
+            <a:spAutoFit/>
+          </a:bodyPr>
+          <a:lstStyle/>
+          <a:p>
+            <a:pPr algn="ctr"/>
+            <a:r>
+              <a:rPr lang="pt-BR" sz="1200" dirty="0">
+                <a:latin typeface="+mj-lt"/>
+              </a:rPr>
+              <a:t>ROTEADOR WI-FI 6 GIGABIT AX5400 ARCHER AX73</a:t>
+            </a:r>
+          </a:p>
+        </p:txBody>
+      </p:sp>
+      <p:sp>
+        <p:nvSpPr>
+          <p:cNvPr id="23" name="Retângulo 22"/>
+          <p:cNvSpPr/>
+          <p:nvPr/>
+        </p:nvSpPr>
+        <p:spPr>
+          <a:xfrm>
+            <a:off x="3757358" y="3982529"/>
+            <a:ext cx="1466979" cy="624981"/>
+          </a:xfrm>
+          <a:prstGeom prst="rect">
+            <a:avLst/>
+          </a:prstGeom>
+          <a:noFill/>
+          <a:ln>
+            <a:solidFill>
+              <a:schemeClr val="tx1"/>
+            </a:solidFill>
+          </a:ln>
+        </p:spPr>
+        <p:style>
+          <a:lnRef idx="2">
+            <a:schemeClr val="accent1">
+              <a:shade val="50000"/>
+            </a:schemeClr>
+          </a:lnRef>
+          <a:fillRef idx="1">
+            <a:schemeClr val="accent1"/>
+          </a:fillRef>
+          <a:effectRef idx="0">
+            <a:schemeClr val="accent1"/>
+          </a:effectRef>
+          <a:fontRef idx="minor">
+            <a:schemeClr val="lt1"/>
+          </a:fontRef>
+        </p:style>
+        <p:txBody>
+          <a:bodyPr rtlCol="0" anchor="ctr"/>
+          <a:lstStyle/>
+          <a:p>
+            <a:pPr algn="ctr"/>
+            <a:endParaRPr lang="pt-BR"/>
+          </a:p>
+        </p:txBody>
+      </p:sp>
+      <p:cxnSp>
+        <p:nvCxnSpPr>
+          <p:cNvPr id="32" name="Conector de Seta Reta 31"/>
+          <p:cNvCxnSpPr/>
+          <p:nvPr/>
+        </p:nvCxnSpPr>
+        <p:spPr>
+          <a:xfrm>
+            <a:off x="6111203" y="2493105"/>
+            <a:ext cx="0" cy="567311"/>
+          </a:xfrm>
+          <a:prstGeom prst="straightConnector1">
+            <a:avLst/>
+          </a:prstGeom>
+          <a:ln>
+            <a:solidFill>
+              <a:schemeClr val="tx1"/>
+            </a:solidFill>
+            <a:tailEnd type="triangle"/>
+          </a:ln>
+        </p:spPr>
+        <p:style>
+          <a:lnRef idx="1">
+            <a:schemeClr val="accent1"/>
+          </a:lnRef>
+          <a:fillRef idx="0">
+            <a:schemeClr val="accent1"/>
+          </a:fillRef>
+          <a:effectRef idx="0">
+            <a:schemeClr val="accent1"/>
+          </a:effectRef>
+          <a:fontRef idx="minor">
+            <a:schemeClr val="tx1"/>
+          </a:fontRef>
+        </p:style>
+      </p:cxnSp>
+      <p:sp>
+        <p:nvSpPr>
+          <p:cNvPr id="34" name="CaixaDeTexto 33"/>
+          <p:cNvSpPr txBox="1"/>
+          <p:nvPr/>
+        </p:nvSpPr>
+        <p:spPr>
+          <a:xfrm>
+            <a:off x="9576833" y="4843178"/>
+            <a:ext cx="2205533" cy="646331"/>
+          </a:xfrm>
+          <a:prstGeom prst="rect">
+            <a:avLst/>
+          </a:prstGeom>
+          <a:noFill/>
+          <a:ln>
+            <a:solidFill>
+              <a:schemeClr val="tx1"/>
+            </a:solidFill>
+          </a:ln>
+        </p:spPr>
+        <p:txBody>
+          <a:bodyPr wrap="square" rtlCol="0">
+            <a:spAutoFit/>
+          </a:bodyPr>
+          <a:lstStyle/>
+          <a:p>
+            <a:pPr algn="ctr"/>
+            <a:r>
+              <a:rPr lang="pt-BR" sz="1200" dirty="0"/>
+              <a:t>Computador com especificações simples para acesso à plataforma</a:t>
+            </a:r>
+          </a:p>
+        </p:txBody>
+      </p:sp>
+      <p:cxnSp>
+        <p:nvCxnSpPr>
+          <p:cNvPr id="38" name="Conector de Seta Reta 37"/>
+          <p:cNvCxnSpPr/>
+          <p:nvPr/>
+        </p:nvCxnSpPr>
+        <p:spPr>
+          <a:xfrm flipH="1">
+            <a:off x="10679600" y="4059387"/>
+            <a:ext cx="1" cy="663050"/>
+          </a:xfrm>
+          <a:prstGeom prst="straightConnector1">
+            <a:avLst/>
+          </a:prstGeom>
+          <a:ln>
+            <a:solidFill>
+              <a:schemeClr val="tx1"/>
+            </a:solidFill>
+            <a:tailEnd type="triangle"/>
+          </a:ln>
+        </p:spPr>
+        <p:style>
+          <a:lnRef idx="1">
+            <a:schemeClr val="accent1"/>
+          </a:lnRef>
+          <a:fillRef idx="0">
+            <a:schemeClr val="accent1"/>
+          </a:fillRef>
+          <a:effectRef idx="0">
+            <a:schemeClr val="accent1"/>
+          </a:effectRef>
+          <a:fontRef idx="minor">
+            <a:schemeClr val="tx1"/>
+          </a:fontRef>
+        </p:style>
+      </p:cxnSp>
+      <p:sp>
+        <p:nvSpPr>
+          <p:cNvPr id="40" name="Retângulo 39"/>
+          <p:cNvSpPr/>
+          <p:nvPr/>
+        </p:nvSpPr>
+        <p:spPr>
+          <a:xfrm>
+            <a:off x="210207" y="1780938"/>
+            <a:ext cx="2165131" cy="3402875"/>
+          </a:xfrm>
+          <a:prstGeom prst="rect">
+            <a:avLst/>
+          </a:prstGeom>
+          <a:noFill/>
+          <a:ln>
+            <a:solidFill>
+              <a:schemeClr val="tx1"/>
+            </a:solidFill>
+          </a:ln>
+        </p:spPr>
+        <p:style>
+          <a:lnRef idx="2">
+            <a:schemeClr val="accent1">
+              <a:shade val="50000"/>
+            </a:schemeClr>
+          </a:lnRef>
+          <a:fillRef idx="1">
+            <a:schemeClr val="accent1"/>
+          </a:fillRef>
+          <a:effectRef idx="0">
+            <a:schemeClr val="accent1"/>
+          </a:effectRef>
+          <a:fontRef idx="minor">
+            <a:schemeClr val="lt1"/>
+          </a:fontRef>
+        </p:style>
+        <p:txBody>
+          <a:bodyPr rtlCol="0" anchor="ctr"/>
+          <a:lstStyle/>
+          <a:p>
+            <a:pPr algn="ctr"/>
+            <a:endParaRPr lang="pt-BR"/>
+          </a:p>
+        </p:txBody>
+      </p:sp>
+      <p:pic>
+        <p:nvPicPr>
+          <p:cNvPr id="41" name="Imagem 40"/>
+          <p:cNvPicPr>
+            <a:picLocks noChangeAspect="1"/>
+          </p:cNvPicPr>
+          <p:nvPr/>
+        </p:nvPicPr>
+        <p:blipFill>
+          <a:blip r:embed="rId6"/>
+          <a:stretch>
+            <a:fillRect/>
+          </a:stretch>
+        </p:blipFill>
+        <p:spPr>
+          <a:xfrm>
+            <a:off x="415815" y="4087057"/>
+            <a:ext cx="831784" cy="831784"/>
+          </a:xfrm>
+          <a:prstGeom prst="rect">
+            <a:avLst/>
+          </a:prstGeom>
+        </p:spPr>
+      </p:pic>
+      <p:pic>
+        <p:nvPicPr>
+          <p:cNvPr id="42" name="Imagem 41"/>
+          <p:cNvPicPr>
+            <a:picLocks noChangeAspect="1"/>
+          </p:cNvPicPr>
+          <p:nvPr/>
+        </p:nvPicPr>
+        <p:blipFill>
+          <a:blip r:embed="rId7" cstate="print"/>
+          <a:stretch>
+            <a:fillRect/>
+          </a:stretch>
+        </p:blipFill>
+        <p:spPr>
+          <a:xfrm>
+            <a:off x="954232" y="2125402"/>
+            <a:ext cx="970114" cy="1111783"/>
+          </a:xfrm>
+          <a:prstGeom prst="rect">
+            <a:avLst/>
+          </a:prstGeom>
+        </p:spPr>
+      </p:pic>
+      <p:sp>
+        <p:nvSpPr>
+          <p:cNvPr id="44" name="Retângulo 43"/>
+          <p:cNvSpPr/>
+          <p:nvPr/>
+        </p:nvSpPr>
+        <p:spPr>
+          <a:xfrm>
+            <a:off x="367862" y="1892903"/>
+            <a:ext cx="1839310" cy="1453021"/>
+          </a:xfrm>
+          <a:prstGeom prst="rect">
+            <a:avLst/>
+          </a:prstGeom>
+          <a:noFill/>
+          <a:ln>
+            <a:solidFill>
+              <a:schemeClr val="tx1"/>
+            </a:solidFill>
+          </a:ln>
+        </p:spPr>
+        <p:style>
+          <a:lnRef idx="2">
+            <a:schemeClr val="accent1">
+              <a:shade val="50000"/>
+            </a:schemeClr>
+          </a:lnRef>
+          <a:fillRef idx="1">
+            <a:schemeClr val="accent1"/>
+          </a:fillRef>
+          <a:effectRef idx="0">
+            <a:schemeClr val="accent1"/>
+          </a:effectRef>
+          <a:fontRef idx="minor">
+            <a:schemeClr val="lt1"/>
+          </a:fontRef>
+        </p:style>
+        <p:txBody>
+          <a:bodyPr rtlCol="0" anchor="ctr"/>
+          <a:lstStyle/>
+          <a:p>
+            <a:pPr algn="ctr"/>
+            <a:endParaRPr lang="pt-BR"/>
+          </a:p>
+        </p:txBody>
+      </p:sp>
+      <p:pic>
+        <p:nvPicPr>
+          <p:cNvPr id="45" name="Imagem 44"/>
+          <p:cNvPicPr>
+            <a:picLocks noChangeAspect="1"/>
+          </p:cNvPicPr>
+          <p:nvPr/>
+        </p:nvPicPr>
+        <p:blipFill>
+          <a:blip r:embed="rId7" cstate="print"/>
+          <a:stretch>
+            <a:fillRect/>
+          </a:stretch>
+        </p:blipFill>
+        <p:spPr>
+          <a:xfrm>
+            <a:off x="938466" y="3812313"/>
+            <a:ext cx="970114" cy="1111783"/>
+          </a:xfrm>
+          <a:prstGeom prst="rect">
+            <a:avLst/>
+          </a:prstGeom>
+        </p:spPr>
+      </p:pic>
+      <p:sp>
+        <p:nvSpPr>
+          <p:cNvPr id="46" name="Retângulo 45"/>
+          <p:cNvSpPr/>
+          <p:nvPr/>
+        </p:nvSpPr>
+        <p:spPr>
+          <a:xfrm>
+            <a:off x="352096" y="3579814"/>
+            <a:ext cx="1839310" cy="1453021"/>
+          </a:xfrm>
+          <a:prstGeom prst="rect">
+            <a:avLst/>
+          </a:prstGeom>
+          <a:noFill/>
+          <a:ln>
+            <a:solidFill>
+              <a:schemeClr val="tx1"/>
+            </a:solidFill>
+          </a:ln>
+        </p:spPr>
+        <p:style>
+          <a:lnRef idx="2">
+            <a:schemeClr val="accent1">
+              <a:shade val="50000"/>
+            </a:schemeClr>
+          </a:lnRef>
+          <a:fillRef idx="1">
+            <a:schemeClr val="accent1"/>
+          </a:fillRef>
+          <a:effectRef idx="0">
+            <a:schemeClr val="accent1"/>
+          </a:effectRef>
+          <a:fontRef idx="minor">
+            <a:schemeClr val="lt1"/>
+          </a:fontRef>
+        </p:style>
+        <p:txBody>
+          <a:bodyPr rtlCol="0" anchor="ctr"/>
+          <a:lstStyle/>
+          <a:p>
+            <a:pPr algn="ctr"/>
+            <a:endParaRPr lang="pt-BR"/>
+          </a:p>
+        </p:txBody>
+      </p:sp>
+      <p:sp>
+        <p:nvSpPr>
+          <p:cNvPr id="49" name="CaixaDeTexto 48"/>
+          <p:cNvSpPr txBox="1"/>
+          <p:nvPr/>
+        </p:nvSpPr>
+        <p:spPr>
+          <a:xfrm>
+            <a:off x="190270" y="395267"/>
+            <a:ext cx="2437317" cy="646331"/>
+          </a:xfrm>
+          <a:prstGeom prst="rect">
+            <a:avLst/>
+          </a:prstGeom>
+          <a:noFill/>
+          <a:ln>
+            <a:solidFill>
+              <a:schemeClr val="tx1"/>
+            </a:solidFill>
+          </a:ln>
+        </p:spPr>
+        <p:txBody>
+          <a:bodyPr wrap="square" rtlCol="0">
+            <a:spAutoFit/>
+          </a:bodyPr>
+          <a:lstStyle/>
+          <a:p>
+            <a:r>
+              <a:rPr lang="pt-BR" sz="1200" dirty="0"/>
+              <a:t>Intensidade luminosa  pré-determinada através da automação da intensidade da lâmpada</a:t>
+            </a:r>
+          </a:p>
+        </p:txBody>
+      </p:sp>
+      <p:cxnSp>
+        <p:nvCxnSpPr>
+          <p:cNvPr id="50" name="Conector de Seta Reta 65"/>
+          <p:cNvCxnSpPr/>
+          <p:nvPr/>
+        </p:nvCxnSpPr>
+        <p:spPr>
+          <a:xfrm flipV="1">
+            <a:off x="1264536" y="1275870"/>
+            <a:ext cx="0" cy="412208"/>
           </a:xfrm>
           <a:prstGeom prst="straightConnector1">
             <a:avLst/>
@@ -4631,14 +5150,296 @@
       </p:cxnSp>
       <p:pic>
         <p:nvPicPr>
-          <p:cNvPr id="21" name="Imagem 20"/>
+          <p:cNvPr id="1028" name="Picture 4" descr="Html Css Icon Png Transparent PNG - 3960x1500 - Free Download on NicePNG">
+            <a:extLst>
+              <a:ext uri="{FF2B5EF4-FFF2-40B4-BE49-F238E27FC236}">
+                <a16:creationId xmlns:a16="http://schemas.microsoft.com/office/drawing/2014/main" id="{95790136-4150-40A3-B7B5-2EAFCB3F1115}"/>
+              </a:ext>
+            </a:extLst>
+          </p:cNvPr>
+          <p:cNvPicPr>
+            <a:picLocks noChangeAspect="1" noChangeArrowheads="1"/>
+          </p:cNvPicPr>
+          <p:nvPr/>
+        </p:nvPicPr>
+        <p:blipFill>
+          <a:blip r:embed="rId8" cstate="print">
+            <a:extLst>
+              <a:ext uri="{28A0092B-C50C-407E-A947-70E740481C1C}">
+                <a14:useLocalDpi xmlns:a14="http://schemas.microsoft.com/office/drawing/2010/main" val="0"/>
+              </a:ext>
+            </a:extLst>
+          </a:blip>
+          <a:srcRect/>
+          <a:stretch>
+            <a:fillRect/>
+          </a:stretch>
+        </p:blipFill>
+        <p:spPr bwMode="auto">
+          <a:xfrm>
+            <a:off x="9834193" y="1318301"/>
+            <a:ext cx="1802222" cy="740669"/>
+          </a:xfrm>
+          <a:prstGeom prst="rect">
+            <a:avLst/>
+          </a:prstGeom>
+          <a:noFill/>
+          <a:extLst>
+            <a:ext uri="{909E8E84-426E-40DD-AFC4-6F175D3DCCD1}">
+              <a14:hiddenFill xmlns:a14="http://schemas.microsoft.com/office/drawing/2010/main">
+                <a:solidFill>
+                  <a:srgbClr val="FFFFFF"/>
+                </a:solidFill>
+              </a14:hiddenFill>
+            </a:ext>
+          </a:extLst>
+        </p:spPr>
+      </p:pic>
+      <p:pic>
+        <p:nvPicPr>
+          <p:cNvPr id="1030" name="Picture 6" descr="Sensor Óptico Reflexivo Fototransistor TCRT5000 - Eletronline Shop -  Arduinos, Módulos, Sensores, 3D e Robótica.">
+            <a:extLst>
+              <a:ext uri="{FF2B5EF4-FFF2-40B4-BE49-F238E27FC236}">
+                <a16:creationId xmlns:a16="http://schemas.microsoft.com/office/drawing/2014/main" id="{8B9AC1B8-428D-4638-AD2C-092953EBD8F0}"/>
+              </a:ext>
+            </a:extLst>
+          </p:cNvPr>
+          <p:cNvPicPr>
+            <a:picLocks noChangeAspect="1" noChangeArrowheads="1"/>
+          </p:cNvPicPr>
+          <p:nvPr/>
+        </p:nvPicPr>
+        <p:blipFill>
+          <a:blip r:embed="rId9" cstate="print">
+            <a:extLst>
+              <a:ext uri="{28A0092B-C50C-407E-A947-70E740481C1C}">
+                <a14:useLocalDpi xmlns:a14="http://schemas.microsoft.com/office/drawing/2010/main" val="0"/>
+              </a:ext>
+            </a:extLst>
+          </a:blip>
+          <a:srcRect/>
+          <a:stretch>
+            <a:fillRect/>
+          </a:stretch>
+        </p:blipFill>
+        <p:spPr bwMode="auto">
+          <a:xfrm rot="13130065">
+            <a:off x="799568" y="5872200"/>
+            <a:ext cx="963303" cy="963303"/>
+          </a:xfrm>
+          <a:prstGeom prst="rect">
+            <a:avLst/>
+          </a:prstGeom>
+          <a:noFill/>
+          <a:extLst>
+            <a:ext uri="{909E8E84-426E-40DD-AFC4-6F175D3DCCD1}">
+              <a14:hiddenFill xmlns:a14="http://schemas.microsoft.com/office/drawing/2010/main">
+                <a:solidFill>
+                  <a:srgbClr val="FFFFFF"/>
+                </a:solidFill>
+              </a14:hiddenFill>
+            </a:ext>
+          </a:extLst>
+        </p:spPr>
+      </p:pic>
+      <p:pic>
+        <p:nvPicPr>
+          <p:cNvPr id="1032" name="Picture 8" descr="mysql-logo-png-transparent ⋆ Altyra - Desenvolvimento de Software">
+            <a:extLst>
+              <a:ext uri="{FF2B5EF4-FFF2-40B4-BE49-F238E27FC236}">
+                <a16:creationId xmlns:a16="http://schemas.microsoft.com/office/drawing/2014/main" id="{C44B72D4-EAF9-4A69-B33F-62F4101520D3}"/>
+              </a:ext>
+            </a:extLst>
+          </p:cNvPr>
+          <p:cNvPicPr>
+            <a:picLocks noChangeAspect="1" noChangeArrowheads="1"/>
+          </p:cNvPicPr>
+          <p:nvPr/>
+        </p:nvPicPr>
+        <p:blipFill>
+          <a:blip r:embed="rId10" cstate="print">
+            <a:extLst>
+              <a:ext uri="{28A0092B-C50C-407E-A947-70E740481C1C}">
+                <a14:useLocalDpi xmlns:a14="http://schemas.microsoft.com/office/drawing/2010/main" val="0"/>
+              </a:ext>
+            </a:extLst>
+          </a:blip>
+          <a:srcRect/>
+          <a:stretch>
+            <a:fillRect/>
+          </a:stretch>
+        </p:blipFill>
+        <p:spPr bwMode="auto">
+          <a:xfrm>
+            <a:off x="5333127" y="4721669"/>
+            <a:ext cx="1333156" cy="924288"/>
+          </a:xfrm>
+          <a:prstGeom prst="rect">
+            <a:avLst/>
+          </a:prstGeom>
+          <a:noFill/>
+          <a:extLst>
+            <a:ext uri="{909E8E84-426E-40DD-AFC4-6F175D3DCCD1}">
+              <a14:hiddenFill xmlns:a14="http://schemas.microsoft.com/office/drawing/2010/main">
+                <a:solidFill>
+                  <a:srgbClr val="FFFFFF"/>
+                </a:solidFill>
+              </a14:hiddenFill>
+            </a:ext>
+          </a:extLst>
+        </p:spPr>
+      </p:pic>
+      <p:pic>
+        <p:nvPicPr>
+          <p:cNvPr id="1034" name="Picture 10" descr="How To Manage And Automate Aws Ebs Snapshots With Powershell - Vmware Cloud  On Aws Logo Transparent, HD Png Download - kindpng">
+            <a:extLst>
+              <a:ext uri="{FF2B5EF4-FFF2-40B4-BE49-F238E27FC236}">
+                <a16:creationId xmlns:a16="http://schemas.microsoft.com/office/drawing/2014/main" id="{1DE0D091-ED4E-4228-A483-19C25FF7B4CA}"/>
+              </a:ext>
+            </a:extLst>
+          </p:cNvPr>
+          <p:cNvPicPr>
+            <a:picLocks noChangeAspect="1" noChangeArrowheads="1"/>
+          </p:cNvPicPr>
+          <p:nvPr/>
+        </p:nvPicPr>
+        <p:blipFill>
+          <a:blip r:embed="rId11" cstate="print">
+            <a:extLst>
+              <a:ext uri="{28A0092B-C50C-407E-A947-70E740481C1C}">
+                <a14:useLocalDpi xmlns:a14="http://schemas.microsoft.com/office/drawing/2010/main" val="0"/>
+              </a:ext>
+            </a:extLst>
+          </a:blip>
+          <a:srcRect/>
+          <a:stretch>
+            <a:fillRect/>
+          </a:stretch>
+        </p:blipFill>
+        <p:spPr bwMode="auto">
+          <a:xfrm>
+            <a:off x="5557039" y="1624849"/>
+            <a:ext cx="1108327" cy="756497"/>
+          </a:xfrm>
+          <a:prstGeom prst="rect">
+            <a:avLst/>
+          </a:prstGeom>
+          <a:noFill/>
+          <a:extLst>
+            <a:ext uri="{909E8E84-426E-40DD-AFC4-6F175D3DCCD1}">
+              <a14:hiddenFill xmlns:a14="http://schemas.microsoft.com/office/drawing/2010/main">
+                <a:solidFill>
+                  <a:srgbClr val="FFFFFF"/>
+                </a:solidFill>
+              </a14:hiddenFill>
+            </a:ext>
+          </a:extLst>
+        </p:spPr>
+      </p:pic>
+      <p:cxnSp>
+        <p:nvCxnSpPr>
+          <p:cNvPr id="53" name="Conector de Seta Reta 52">
+            <a:extLst>
+              <a:ext uri="{FF2B5EF4-FFF2-40B4-BE49-F238E27FC236}">
+                <a16:creationId xmlns:a16="http://schemas.microsoft.com/office/drawing/2014/main" id="{88E1EB20-C789-47E4-AFE8-9BCA194E2AA2}"/>
+              </a:ext>
+            </a:extLst>
+          </p:cNvPr>
+          <p:cNvCxnSpPr>
+            <a:cxnSpLocks/>
+          </p:cNvCxnSpPr>
+          <p:nvPr/>
+        </p:nvCxnSpPr>
+        <p:spPr>
+          <a:xfrm>
+            <a:off x="3539478" y="3667539"/>
+            <a:ext cx="482106" cy="0"/>
+          </a:xfrm>
+          <a:prstGeom prst="straightConnector1">
+            <a:avLst/>
+          </a:prstGeom>
+          <a:ln>
+            <a:solidFill>
+              <a:schemeClr val="tx1"/>
+            </a:solidFill>
+            <a:tailEnd type="triangle"/>
+          </a:ln>
+        </p:spPr>
+        <p:style>
+          <a:lnRef idx="1">
+            <a:schemeClr val="accent1"/>
+          </a:lnRef>
+          <a:fillRef idx="0">
+            <a:schemeClr val="accent1"/>
+          </a:fillRef>
+          <a:effectRef idx="0">
+            <a:schemeClr val="accent1"/>
+          </a:effectRef>
+          <a:fontRef idx="minor">
+            <a:schemeClr val="tx1"/>
+          </a:fontRef>
+        </p:style>
+      </p:cxnSp>
+      <p:cxnSp>
+        <p:nvCxnSpPr>
+          <p:cNvPr id="54" name="Conector de Seta Reta 53">
+            <a:extLst>
+              <a:ext uri="{FF2B5EF4-FFF2-40B4-BE49-F238E27FC236}">
+                <a16:creationId xmlns:a16="http://schemas.microsoft.com/office/drawing/2014/main" id="{4141F595-20AD-4F10-B44E-AD992603BC05}"/>
+              </a:ext>
+            </a:extLst>
+          </p:cNvPr>
+          <p:cNvCxnSpPr>
+            <a:cxnSpLocks/>
+          </p:cNvCxnSpPr>
+          <p:nvPr/>
+        </p:nvCxnSpPr>
+        <p:spPr>
+          <a:xfrm flipV="1">
+            <a:off x="3242673" y="2876542"/>
+            <a:ext cx="0" cy="348837"/>
+          </a:xfrm>
+          <a:prstGeom prst="straightConnector1">
+            <a:avLst/>
+          </a:prstGeom>
+          <a:ln>
+            <a:solidFill>
+              <a:schemeClr val="tx1"/>
+            </a:solidFill>
+            <a:tailEnd type="triangle"/>
+          </a:ln>
+        </p:spPr>
+        <p:style>
+          <a:lnRef idx="1">
+            <a:schemeClr val="accent1"/>
+          </a:lnRef>
+          <a:fillRef idx="0">
+            <a:schemeClr val="accent1"/>
+          </a:fillRef>
+          <a:effectRef idx="0">
+            <a:schemeClr val="accent1"/>
+          </a:effectRef>
+          <a:fontRef idx="minor">
+            <a:schemeClr val="tx1"/>
+          </a:fontRef>
+        </p:style>
+      </p:cxnSp>
+      <p:pic>
+        <p:nvPicPr>
+          <p:cNvPr id="98" name="Imagem 97">
+            <a:extLst>
+              <a:ext uri="{FF2B5EF4-FFF2-40B4-BE49-F238E27FC236}">
+                <a16:creationId xmlns:a16="http://schemas.microsoft.com/office/drawing/2014/main" id="{9128B919-D840-4A36-A248-26BC6470AFA3}"/>
+              </a:ext>
+            </a:extLst>
+          </p:cNvPr>
           <p:cNvPicPr>
             <a:picLocks noChangeAspect="1"/>
           </p:cNvPicPr>
           <p:nvPr/>
         </p:nvPicPr>
         <p:blipFill>
-          <a:blip r:embed="rId6">
+          <a:blip r:embed="rId2">
             <a:extLst>
               <a:ext uri="{28A0092B-C50C-407E-A947-70E740481C1C}">
                 <a14:useLocalDpi xmlns:a14="http://schemas.microsoft.com/office/drawing/2010/main" val="0"/>
@@ -4651,8 +5452,8 @@
         </p:blipFill>
         <p:spPr>
           <a:xfrm>
-            <a:off x="6778691" y="3116142"/>
-            <a:ext cx="1187139" cy="1187139"/>
+            <a:off x="7446224" y="3334678"/>
+            <a:ext cx="551320" cy="551320"/>
           </a:xfrm>
           <a:prstGeom prst="rect">
             <a:avLst/>
@@ -4661,14 +5462,20 @@
       </p:pic>
       <p:pic>
         <p:nvPicPr>
-          <p:cNvPr id="28" name="Imagem 27"/>
+          <p:cNvPr id="99" name="Imagem 98">
+            <a:extLst>
+              <a:ext uri="{FF2B5EF4-FFF2-40B4-BE49-F238E27FC236}">
+                <a16:creationId xmlns:a16="http://schemas.microsoft.com/office/drawing/2014/main" id="{F48D80DD-4593-4C73-979C-EEE4E3C67C0D}"/>
+              </a:ext>
+            </a:extLst>
+          </p:cNvPr>
           <p:cNvPicPr>
             <a:picLocks noChangeAspect="1"/>
           </p:cNvPicPr>
           <p:nvPr/>
         </p:nvPicPr>
         <p:blipFill>
-          <a:blip r:embed="rId7">
+          <a:blip r:embed="rId3">
             <a:extLst>
               <a:ext uri="{28A0092B-C50C-407E-A947-70E740481C1C}">
                 <a14:useLocalDpi xmlns:a14="http://schemas.microsoft.com/office/drawing/2010/main" val="0"/>
@@ -4681,60 +5488,32 @@
         </p:blipFill>
         <p:spPr>
           <a:xfrm>
-            <a:off x="9726068" y="3050961"/>
-            <a:ext cx="903209" cy="903209"/>
+            <a:off x="8758859" y="3339085"/>
+            <a:ext cx="572706" cy="572706"/>
           </a:xfrm>
           <a:prstGeom prst="rect">
             <a:avLst/>
           </a:prstGeom>
         </p:spPr>
       </p:pic>
-      <p:sp>
-        <p:nvSpPr>
-          <p:cNvPr id="43" name="CaixaDeTexto 42"/>
-          <p:cNvSpPr txBox="1"/>
-          <p:nvPr/>
-        </p:nvSpPr>
-        <p:spPr>
-          <a:xfrm>
-            <a:off x="363690" y="5781818"/>
-            <a:ext cx="2101485" cy="646331"/>
-          </a:xfrm>
-          <a:prstGeom prst="rect">
-            <a:avLst/>
-          </a:prstGeom>
-          <a:noFill/>
-          <a:ln>
-            <a:solidFill>
-              <a:schemeClr val="tx1"/>
-            </a:solidFill>
-          </a:ln>
-        </p:spPr>
-        <p:txBody>
-          <a:bodyPr wrap="square" rtlCol="0">
-            <a:spAutoFit/>
-          </a:bodyPr>
-          <a:lstStyle/>
-          <a:p>
-            <a:pPr algn="ctr"/>
-            <a:r>
-              <a:rPr lang="pt-BR" sz="1200" dirty="0" smtClean="0"/>
-              <a:t>As informações são captadas através dos sensores LDR e TR C5000</a:t>
-            </a:r>
-            <a:endParaRPr lang="pt-BR" sz="1200" dirty="0"/>
-          </a:p>
-        </p:txBody>
-      </p:sp>
       <p:cxnSp>
         <p:nvCxnSpPr>
-          <p:cNvPr id="48" name="Conector de Seta Reta 47"/>
-          <p:cNvCxnSpPr/>
+          <p:cNvPr id="110" name="Conector de Seta Reta 109">
+            <a:extLst>
+              <a:ext uri="{FF2B5EF4-FFF2-40B4-BE49-F238E27FC236}">
+                <a16:creationId xmlns:a16="http://schemas.microsoft.com/office/drawing/2014/main" id="{CFFE2C86-F9A0-4413-A1B4-A252ED283E1C}"/>
+              </a:ext>
+            </a:extLst>
+          </p:cNvPr>
+          <p:cNvCxnSpPr>
+            <a:cxnSpLocks/>
+          </p:cNvCxnSpPr>
           <p:nvPr/>
         </p:nvCxnSpPr>
         <p:spPr>
-          <a:xfrm>
-            <a:off x="1281221" y="5290460"/>
-            <a:ext cx="0" cy="433161"/>
+          <a:xfrm flipH="1">
+            <a:off x="9545668" y="3685159"/>
+            <a:ext cx="577049" cy="0"/>
           </a:xfrm>
           <a:prstGeom prst="straightConnector1">
             <a:avLst/>
@@ -4763,127 +5542,22 @@
       </p:cxnSp>
       <p:cxnSp>
         <p:nvCxnSpPr>
-          <p:cNvPr id="55" name="Conector de Seta Reta 54"/>
-          <p:cNvCxnSpPr/>
+          <p:cNvPr id="111" name="Conector de Seta Reta 110">
+            <a:extLst>
+              <a:ext uri="{FF2B5EF4-FFF2-40B4-BE49-F238E27FC236}">
+                <a16:creationId xmlns:a16="http://schemas.microsoft.com/office/drawing/2014/main" id="{E23A28A2-E8F5-4309-B546-A09755860753}"/>
+              </a:ext>
+            </a:extLst>
+          </p:cNvPr>
+          <p:cNvCxnSpPr>
+            <a:cxnSpLocks/>
+          </p:cNvCxnSpPr>
           <p:nvPr/>
         </p:nvCxnSpPr>
         <p:spPr>
-          <a:xfrm>
-            <a:off x="2137561" y="3668660"/>
-            <a:ext cx="655228" cy="0"/>
-          </a:xfrm>
-          <a:prstGeom prst="straightConnector1">
-            <a:avLst/>
-          </a:prstGeom>
-          <a:ln>
-            <a:solidFill>
-              <a:schemeClr val="tx1"/>
-            </a:solidFill>
-            <a:tailEnd type="triangle"/>
-          </a:ln>
-        </p:spPr>
-        <p:style>
-          <a:lnRef idx="1">
-            <a:schemeClr val="accent1"/>
-          </a:lnRef>
-          <a:fillRef idx="0">
-            <a:schemeClr val="accent1"/>
-          </a:fillRef>
-          <a:effectRef idx="0">
-            <a:schemeClr val="accent1"/>
-          </a:effectRef>
-          <a:fontRef idx="minor">
-            <a:schemeClr val="tx1"/>
-          </a:fontRef>
-        </p:style>
-      </p:cxnSp>
-      <p:sp>
-        <p:nvSpPr>
-          <p:cNvPr id="61" name="CaixaDeTexto 60"/>
-          <p:cNvSpPr txBox="1"/>
-          <p:nvPr/>
-        </p:nvSpPr>
-        <p:spPr>
-          <a:xfrm>
-            <a:off x="2943005" y="2141059"/>
-            <a:ext cx="2791675" cy="461665"/>
-          </a:xfrm>
-          <a:prstGeom prst="rect">
-            <a:avLst/>
-          </a:prstGeom>
-          <a:noFill/>
-        </p:spPr>
-        <p:txBody>
-          <a:bodyPr wrap="square" rtlCol="0">
-            <a:spAutoFit/>
-          </a:bodyPr>
-          <a:lstStyle/>
-          <a:p>
-            <a:pPr algn="ctr"/>
-            <a:r>
-              <a:rPr lang="pt-BR" sz="1200" dirty="0" smtClean="0"/>
-              <a:t>Internet de fibra e Roteador de longo alcance recebe as informações </a:t>
-            </a:r>
-            <a:endParaRPr lang="pt-BR" sz="1200" dirty="0"/>
-          </a:p>
-        </p:txBody>
-      </p:sp>
-      <p:sp>
-        <p:nvSpPr>
-          <p:cNvPr id="62" name="Retângulo 61"/>
-          <p:cNvSpPr/>
-          <p:nvPr/>
-        </p:nvSpPr>
-        <p:spPr>
-          <a:xfrm>
-            <a:off x="2910188" y="2080268"/>
-            <a:ext cx="2932314" cy="587092"/>
-          </a:xfrm>
-          <a:prstGeom prst="rect">
-            <a:avLst/>
-          </a:prstGeom>
-          <a:noFill/>
-          <a:ln>
-            <a:solidFill>
-              <a:schemeClr val="tx1"/>
-            </a:solidFill>
-          </a:ln>
-        </p:spPr>
-        <p:style>
-          <a:lnRef idx="2">
-            <a:schemeClr val="accent1">
-              <a:shade val="50000"/>
-            </a:schemeClr>
-          </a:lnRef>
-          <a:fillRef idx="1">
-            <a:schemeClr val="accent1"/>
-          </a:fillRef>
-          <a:effectRef idx="0">
-            <a:schemeClr val="accent1"/>
-          </a:effectRef>
-          <a:fontRef idx="minor">
-            <a:schemeClr val="lt1"/>
-          </a:fontRef>
-        </p:style>
-        <p:txBody>
-          <a:bodyPr rtlCol="0" anchor="ctr"/>
-          <a:lstStyle/>
-          <a:p>
-            <a:pPr algn="ctr"/>
-            <a:endParaRPr lang="pt-BR"/>
-          </a:p>
-        </p:txBody>
-      </p:sp>
-      <p:cxnSp>
-        <p:nvCxnSpPr>
-          <p:cNvPr id="66" name="Conector de Seta Reta 65"/>
-          <p:cNvCxnSpPr/>
-          <p:nvPr/>
-        </p:nvCxnSpPr>
-        <p:spPr>
-          <a:xfrm flipV="1">
-            <a:off x="3308684" y="2833001"/>
-            <a:ext cx="0" cy="412208"/>
+          <a:xfrm flipH="1">
+            <a:off x="8066401" y="3691323"/>
+            <a:ext cx="577049" cy="0"/>
           </a:xfrm>
           <a:prstGeom prst="straightConnector1">
             <a:avLst/>
@@ -4912,588 +5586,33 @@
       </p:cxnSp>
       <p:cxnSp>
         <p:nvCxnSpPr>
-          <p:cNvPr id="68" name="Conector de Seta Reta 67"/>
-          <p:cNvCxnSpPr/>
+          <p:cNvPr id="1031" name="Conector: Angulado 1030">
+            <a:extLst>
+              <a:ext uri="{FF2B5EF4-FFF2-40B4-BE49-F238E27FC236}">
+                <a16:creationId xmlns:a16="http://schemas.microsoft.com/office/drawing/2014/main" id="{81867247-C446-4434-8E1D-3FBFBBD8694D}"/>
+              </a:ext>
+            </a:extLst>
+          </p:cNvPr>
+          <p:cNvCxnSpPr>
+            <a:cxnSpLocks/>
+          </p:cNvCxnSpPr>
           <p:nvPr/>
         </p:nvCxnSpPr>
         <p:spPr>
-          <a:xfrm flipV="1">
-            <a:off x="5225872" y="2833001"/>
-            <a:ext cx="0" cy="412208"/>
-          </a:xfrm>
-          <a:prstGeom prst="straightConnector1">
-            <a:avLst/>
+          <a:xfrm>
+            <a:off x="6846861" y="2034836"/>
+            <a:ext cx="3349870" cy="994827"/>
+          </a:xfrm>
+          <a:prstGeom prst="bentConnector3">
+            <a:avLst>
+              <a:gd name="adj1" fmla="val 50000"/>
+            </a:avLst>
           </a:prstGeom>
           <a:ln>
             <a:solidFill>
               <a:schemeClr val="tx1"/>
             </a:solidFill>
-            <a:tailEnd type="triangle"/>
-          </a:ln>
-        </p:spPr>
-        <p:style>
-          <a:lnRef idx="1">
-            <a:schemeClr val="accent1"/>
-          </a:lnRef>
-          <a:fillRef idx="0">
-            <a:schemeClr val="accent1"/>
-          </a:fillRef>
-          <a:effectRef idx="0">
-            <a:schemeClr val="accent1"/>
-          </a:effectRef>
-          <a:fontRef idx="minor">
-            <a:schemeClr val="tx1"/>
-          </a:fontRef>
-        </p:style>
-      </p:cxnSp>
-      <p:sp>
-        <p:nvSpPr>
-          <p:cNvPr id="81" name="CaixaDeTexto 80"/>
-          <p:cNvSpPr txBox="1"/>
-          <p:nvPr/>
-        </p:nvSpPr>
-        <p:spPr>
-          <a:xfrm>
-            <a:off x="6350618" y="4883656"/>
-            <a:ext cx="2227218" cy="646331"/>
-          </a:xfrm>
-          <a:prstGeom prst="rect">
-            <a:avLst/>
-          </a:prstGeom>
-          <a:noFill/>
-        </p:spPr>
-        <p:txBody>
-          <a:bodyPr wrap="square" rtlCol="0">
-            <a:spAutoFit/>
-          </a:bodyPr>
-          <a:lstStyle/>
-          <a:p>
-            <a:pPr algn="ctr"/>
-            <a:r>
-              <a:rPr lang="pt-BR" sz="1200" dirty="0" smtClean="0"/>
-              <a:t>As informações  são armazenadas no Banco de Dados MySQL Server  </a:t>
-            </a:r>
-            <a:endParaRPr lang="pt-BR" sz="1200" dirty="0"/>
-          </a:p>
-        </p:txBody>
-      </p:sp>
-      <p:sp>
-        <p:nvSpPr>
-          <p:cNvPr id="82" name="Retângulo 81"/>
-          <p:cNvSpPr/>
-          <p:nvPr/>
-        </p:nvSpPr>
-        <p:spPr>
-          <a:xfrm>
-            <a:off x="6350618" y="4870592"/>
-            <a:ext cx="2336182" cy="672460"/>
-          </a:xfrm>
-          <a:prstGeom prst="rect">
-            <a:avLst/>
-          </a:prstGeom>
-          <a:noFill/>
-          <a:ln>
-            <a:solidFill>
-              <a:schemeClr val="tx1"/>
-            </a:solidFill>
-          </a:ln>
-        </p:spPr>
-        <p:style>
-          <a:lnRef idx="2">
-            <a:schemeClr val="accent1">
-              <a:shade val="50000"/>
-            </a:schemeClr>
-          </a:lnRef>
-          <a:fillRef idx="1">
-            <a:schemeClr val="accent1"/>
-          </a:fillRef>
-          <a:effectRef idx="0">
-            <a:schemeClr val="accent1"/>
-          </a:effectRef>
-          <a:fontRef idx="minor">
-            <a:schemeClr val="lt1"/>
-          </a:fontRef>
-        </p:style>
-        <p:txBody>
-          <a:bodyPr rtlCol="0" anchor="ctr"/>
-          <a:lstStyle/>
-          <a:p>
-            <a:pPr algn="ctr"/>
-            <a:endParaRPr lang="pt-BR"/>
-          </a:p>
-        </p:txBody>
-      </p:sp>
-      <p:cxnSp>
-        <p:nvCxnSpPr>
-          <p:cNvPr id="84" name="Conector de Seta Reta 83"/>
-          <p:cNvCxnSpPr/>
-          <p:nvPr/>
-        </p:nvCxnSpPr>
-        <p:spPr>
-          <a:xfrm>
-            <a:off x="7372260" y="4439550"/>
-            <a:ext cx="0" cy="305889"/>
-          </a:xfrm>
-          <a:prstGeom prst="straightConnector1">
-            <a:avLst/>
-          </a:prstGeom>
-          <a:ln>
-            <a:solidFill>
-              <a:schemeClr val="tx1"/>
-            </a:solidFill>
-            <a:tailEnd type="triangle"/>
-          </a:ln>
-        </p:spPr>
-        <p:style>
-          <a:lnRef idx="1">
-            <a:schemeClr val="accent1"/>
-          </a:lnRef>
-          <a:fillRef idx="0">
-            <a:schemeClr val="accent1"/>
-          </a:fillRef>
-          <a:effectRef idx="0">
-            <a:schemeClr val="accent1"/>
-          </a:effectRef>
-          <a:fontRef idx="minor">
-            <a:schemeClr val="tx1"/>
-          </a:fontRef>
-        </p:style>
-      </p:cxnSp>
-      <p:sp>
-        <p:nvSpPr>
-          <p:cNvPr id="86" name="Retângulo 85"/>
-          <p:cNvSpPr/>
-          <p:nvPr/>
-        </p:nvSpPr>
-        <p:spPr>
-          <a:xfrm>
-            <a:off x="9263656" y="1033092"/>
-            <a:ext cx="1929123" cy="1047176"/>
-          </a:xfrm>
-          <a:prstGeom prst="rect">
-            <a:avLst/>
-          </a:prstGeom>
-          <a:solidFill>
-            <a:schemeClr val="bg1"/>
-          </a:solidFill>
-          <a:ln>
-            <a:solidFill>
-              <a:schemeClr val="tx1"/>
-            </a:solidFill>
-          </a:ln>
-        </p:spPr>
-        <p:style>
-          <a:lnRef idx="2">
-            <a:schemeClr val="accent1">
-              <a:shade val="50000"/>
-            </a:schemeClr>
-          </a:lnRef>
-          <a:fillRef idx="1">
-            <a:schemeClr val="accent1"/>
-          </a:fillRef>
-          <a:effectRef idx="0">
-            <a:schemeClr val="accent1"/>
-          </a:effectRef>
-          <a:fontRef idx="minor">
-            <a:schemeClr val="lt1"/>
-          </a:fontRef>
-        </p:style>
-        <p:txBody>
-          <a:bodyPr rtlCol="0" anchor="ctr"/>
-          <a:lstStyle/>
-          <a:p>
-            <a:pPr algn="ctr"/>
-            <a:endParaRPr lang="pt-BR"/>
-          </a:p>
-        </p:txBody>
-      </p:sp>
-      <p:sp>
-        <p:nvSpPr>
-          <p:cNvPr id="90" name="CaixaDeTexto 89"/>
-          <p:cNvSpPr txBox="1"/>
-          <p:nvPr/>
-        </p:nvSpPr>
-        <p:spPr>
-          <a:xfrm>
-            <a:off x="2286000" y="378823"/>
-            <a:ext cx="6334955" cy="1077218"/>
-          </a:xfrm>
-          <a:prstGeom prst="rect">
-            <a:avLst/>
-          </a:prstGeom>
-          <a:noFill/>
-        </p:spPr>
-        <p:txBody>
-          <a:bodyPr wrap="square" rtlCol="0">
-            <a:spAutoFit/>
-          </a:bodyPr>
-          <a:lstStyle/>
-          <a:p>
-            <a:pPr algn="ctr"/>
-            <a:r>
-              <a:rPr lang="pt-BR" sz="3200" dirty="0" smtClean="0">
-                <a:latin typeface="Arial Black" panose="020B0A04020102020204" pitchFamily="34" charset="0"/>
-              </a:rPr>
-              <a:t>Solução Técnica - TecShine </a:t>
-            </a:r>
-            <a:endParaRPr lang="pt-BR" sz="3200" dirty="0">
-              <a:latin typeface="Arial Black" panose="020B0A04020102020204" pitchFamily="34" charset="0"/>
-            </a:endParaRPr>
-          </a:p>
-        </p:txBody>
-      </p:sp>
-      <p:cxnSp>
-        <p:nvCxnSpPr>
-          <p:cNvPr id="13" name="Conector de Seta Reta 12"/>
-          <p:cNvCxnSpPr/>
-          <p:nvPr/>
-        </p:nvCxnSpPr>
-        <p:spPr>
-          <a:xfrm>
-            <a:off x="8242663" y="3619953"/>
-            <a:ext cx="888274" cy="0"/>
-          </a:xfrm>
-          <a:prstGeom prst="straightConnector1">
-            <a:avLst/>
-          </a:prstGeom>
-          <a:ln>
-            <a:solidFill>
-              <a:schemeClr val="tx1"/>
-            </a:solidFill>
-            <a:tailEnd type="triangle"/>
-          </a:ln>
-        </p:spPr>
-        <p:style>
-          <a:lnRef idx="1">
-            <a:schemeClr val="accent1"/>
-          </a:lnRef>
-          <a:fillRef idx="0">
-            <a:schemeClr val="accent1"/>
-          </a:fillRef>
-          <a:effectRef idx="0">
-            <a:schemeClr val="accent1"/>
-          </a:effectRef>
-          <a:fontRef idx="minor">
-            <a:schemeClr val="tx1"/>
-          </a:fontRef>
-        </p:style>
-      </p:cxnSp>
-      <p:cxnSp>
-        <p:nvCxnSpPr>
-          <p:cNvPr id="16" name="Conector de Seta Reta 15"/>
-          <p:cNvCxnSpPr/>
-          <p:nvPr/>
-        </p:nvCxnSpPr>
-        <p:spPr>
-          <a:xfrm flipH="1" flipV="1">
-            <a:off x="10177672" y="2259874"/>
-            <a:ext cx="1" cy="657296"/>
-          </a:xfrm>
-          <a:prstGeom prst="straightConnector1">
-            <a:avLst/>
-          </a:prstGeom>
-          <a:ln>
-            <a:solidFill>
-              <a:schemeClr val="tx1"/>
-            </a:solidFill>
-            <a:tailEnd type="triangle"/>
-          </a:ln>
-        </p:spPr>
-        <p:style>
-          <a:lnRef idx="1">
-            <a:schemeClr val="accent1"/>
-          </a:lnRef>
-          <a:fillRef idx="0">
-            <a:schemeClr val="accent1"/>
-          </a:fillRef>
-          <a:effectRef idx="0">
-            <a:schemeClr val="accent1"/>
-          </a:effectRef>
-          <a:fontRef idx="minor">
-            <a:schemeClr val="tx1"/>
-          </a:fontRef>
-        </p:style>
-      </p:cxnSp>
-      <p:sp>
-        <p:nvSpPr>
-          <p:cNvPr id="17" name="CaixaDeTexto 16"/>
-          <p:cNvSpPr txBox="1"/>
-          <p:nvPr/>
-        </p:nvSpPr>
-        <p:spPr>
-          <a:xfrm>
-            <a:off x="9196251" y="1064605"/>
-            <a:ext cx="2063931" cy="1015663"/>
-          </a:xfrm>
-          <a:prstGeom prst="rect">
-            <a:avLst/>
-          </a:prstGeom>
-          <a:noFill/>
-        </p:spPr>
-        <p:txBody>
-          <a:bodyPr wrap="square" rtlCol="0">
-            <a:spAutoFit/>
-          </a:bodyPr>
-          <a:lstStyle/>
-          <a:p>
-            <a:pPr algn="ctr"/>
-            <a:r>
-              <a:rPr lang="pt-BR" sz="1200" dirty="0" smtClean="0"/>
-              <a:t>Através da Plataforma desenvolvida em HTML, CSS e JavaScript   o usuário acompanha todas as informações</a:t>
-            </a:r>
-            <a:endParaRPr lang="pt-BR" sz="1200" dirty="0"/>
-          </a:p>
-        </p:txBody>
-      </p:sp>
-      <p:sp>
-        <p:nvSpPr>
-          <p:cNvPr id="22" name="CaixaDeTexto 21"/>
-          <p:cNvSpPr txBox="1"/>
-          <p:nvPr/>
-        </p:nvSpPr>
-        <p:spPr>
-          <a:xfrm>
-            <a:off x="4682015" y="4099443"/>
-            <a:ext cx="1384663" cy="646331"/>
-          </a:xfrm>
-          <a:prstGeom prst="rect">
-            <a:avLst/>
-          </a:prstGeom>
-          <a:noFill/>
-        </p:spPr>
-        <p:txBody>
-          <a:bodyPr wrap="square" rtlCol="0">
-            <a:spAutoFit/>
-          </a:bodyPr>
-          <a:lstStyle/>
-          <a:p>
-            <a:pPr algn="ctr"/>
-            <a:r>
-              <a:rPr lang="pt-BR" sz="1200" dirty="0">
-                <a:latin typeface="+mj-lt"/>
-              </a:rPr>
-              <a:t>ROTEADOR WI-FI 6 GIGABIT AX5400 ARCHER AX73</a:t>
-            </a:r>
-          </a:p>
-        </p:txBody>
-      </p:sp>
-      <p:sp>
-        <p:nvSpPr>
-          <p:cNvPr id="23" name="Retângulo 22"/>
-          <p:cNvSpPr/>
-          <p:nvPr/>
-        </p:nvSpPr>
-        <p:spPr>
-          <a:xfrm>
-            <a:off x="4629764" y="4058433"/>
-            <a:ext cx="1491115" cy="656517"/>
-          </a:xfrm>
-          <a:prstGeom prst="rect">
-            <a:avLst/>
-          </a:prstGeom>
-          <a:noFill/>
-          <a:ln>
-            <a:solidFill>
-              <a:schemeClr val="tx1"/>
-            </a:solidFill>
-          </a:ln>
-        </p:spPr>
-        <p:style>
-          <a:lnRef idx="2">
-            <a:schemeClr val="accent1">
-              <a:shade val="50000"/>
-            </a:schemeClr>
-          </a:lnRef>
-          <a:fillRef idx="1">
-            <a:schemeClr val="accent1"/>
-          </a:fillRef>
-          <a:effectRef idx="0">
-            <a:schemeClr val="accent1"/>
-          </a:effectRef>
-          <a:fontRef idx="minor">
-            <a:schemeClr val="lt1"/>
-          </a:fontRef>
-        </p:style>
-        <p:txBody>
-          <a:bodyPr rtlCol="0" anchor="ctr"/>
-          <a:lstStyle/>
-          <a:p>
-            <a:pPr algn="ctr"/>
-            <a:endParaRPr lang="pt-BR"/>
-          </a:p>
-        </p:txBody>
-      </p:sp>
-      <p:sp>
-        <p:nvSpPr>
-          <p:cNvPr id="24" name="Retângulo 23"/>
-          <p:cNvSpPr/>
-          <p:nvPr/>
-        </p:nvSpPr>
-        <p:spPr>
-          <a:xfrm>
-            <a:off x="6347649" y="1946476"/>
-            <a:ext cx="1625747" cy="461665"/>
-          </a:xfrm>
-          <a:prstGeom prst="rect">
-            <a:avLst/>
-          </a:prstGeom>
-        </p:spPr>
-        <p:txBody>
-          <a:bodyPr wrap="square">
-            <a:spAutoFit/>
-          </a:bodyPr>
-          <a:lstStyle/>
-          <a:p>
-            <a:pPr algn="ctr"/>
-            <a:r>
-              <a:rPr lang="pt-BR" sz="1200" i="0" dirty="0" smtClean="0">
-                <a:solidFill>
-                  <a:srgbClr val="202124"/>
-                </a:solidFill>
-                <a:effectLst/>
-              </a:rPr>
-              <a:t>Servidor Amazon Web Services (AWS)</a:t>
-            </a:r>
-            <a:endParaRPr lang="pt-BR" sz="1200" dirty="0"/>
-          </a:p>
-        </p:txBody>
-      </p:sp>
-      <p:sp>
-        <p:nvSpPr>
-          <p:cNvPr id="25" name="Retângulo 24"/>
-          <p:cNvSpPr/>
-          <p:nvPr/>
-        </p:nvSpPr>
-        <p:spPr>
-          <a:xfrm>
-            <a:off x="6311153" y="1946476"/>
-            <a:ext cx="1709165" cy="448601"/>
-          </a:xfrm>
-          <a:prstGeom prst="rect">
-            <a:avLst/>
-          </a:prstGeom>
-          <a:noFill/>
-          <a:ln>
-            <a:solidFill>
-              <a:schemeClr val="tx1"/>
-            </a:solidFill>
-          </a:ln>
-        </p:spPr>
-        <p:style>
-          <a:lnRef idx="2">
-            <a:schemeClr val="accent1">
-              <a:shade val="50000"/>
-            </a:schemeClr>
-          </a:lnRef>
-          <a:fillRef idx="1">
-            <a:schemeClr val="accent1"/>
-          </a:fillRef>
-          <a:effectRef idx="0">
-            <a:schemeClr val="accent1"/>
-          </a:effectRef>
-          <a:fontRef idx="minor">
-            <a:schemeClr val="lt1"/>
-          </a:fontRef>
-        </p:style>
-        <p:txBody>
-          <a:bodyPr rtlCol="0" anchor="ctr"/>
-          <a:lstStyle/>
-          <a:p>
-            <a:pPr algn="ctr"/>
-            <a:endParaRPr lang="pt-BR"/>
-          </a:p>
-        </p:txBody>
-      </p:sp>
-      <p:cxnSp>
-        <p:nvCxnSpPr>
-          <p:cNvPr id="32" name="Conector de Seta Reta 31"/>
-          <p:cNvCxnSpPr/>
-          <p:nvPr/>
-        </p:nvCxnSpPr>
-        <p:spPr>
-          <a:xfrm>
-            <a:off x="7160522" y="2483650"/>
-            <a:ext cx="0" cy="567311"/>
-          </a:xfrm>
-          <a:prstGeom prst="straightConnector1">
-            <a:avLst/>
-          </a:prstGeom>
-          <a:ln>
-            <a:solidFill>
-              <a:schemeClr val="tx1"/>
-            </a:solidFill>
-            <a:tailEnd type="triangle"/>
-          </a:ln>
-        </p:spPr>
-        <p:style>
-          <a:lnRef idx="1">
-            <a:schemeClr val="accent1"/>
-          </a:lnRef>
-          <a:fillRef idx="0">
-            <a:schemeClr val="accent1"/>
-          </a:fillRef>
-          <a:effectRef idx="0">
-            <a:schemeClr val="accent1"/>
-          </a:effectRef>
-          <a:fontRef idx="minor">
-            <a:schemeClr val="tx1"/>
-          </a:fontRef>
-        </p:style>
-      </p:cxnSp>
-      <p:sp>
-        <p:nvSpPr>
-          <p:cNvPr id="34" name="CaixaDeTexto 33"/>
-          <p:cNvSpPr txBox="1"/>
-          <p:nvPr/>
-        </p:nvSpPr>
-        <p:spPr>
-          <a:xfrm>
-            <a:off x="9275740" y="4924863"/>
-            <a:ext cx="2205533" cy="646331"/>
-          </a:xfrm>
-          <a:prstGeom prst="rect">
-            <a:avLst/>
-          </a:prstGeom>
-          <a:noFill/>
-          <a:ln>
-            <a:solidFill>
-              <a:schemeClr val="tx1"/>
-            </a:solidFill>
-          </a:ln>
-        </p:spPr>
-        <p:txBody>
-          <a:bodyPr wrap="square" rtlCol="0">
-            <a:spAutoFit/>
-          </a:bodyPr>
-          <a:lstStyle/>
-          <a:p>
-            <a:pPr algn="ctr"/>
-            <a:r>
-              <a:rPr lang="pt-BR" sz="1200" dirty="0" smtClean="0"/>
-              <a:t>Computador com especificações simples para acesso à plataforma</a:t>
-            </a:r>
-            <a:endParaRPr lang="pt-BR" sz="1200" dirty="0"/>
-          </a:p>
-        </p:txBody>
-      </p:sp>
-      <p:cxnSp>
-        <p:nvCxnSpPr>
-          <p:cNvPr id="38" name="Conector de Seta Reta 37"/>
-          <p:cNvCxnSpPr/>
-          <p:nvPr/>
-        </p:nvCxnSpPr>
-        <p:spPr>
-          <a:xfrm flipH="1">
-            <a:off x="10192441" y="4108025"/>
-            <a:ext cx="1" cy="663050"/>
-          </a:xfrm>
-          <a:prstGeom prst="straightConnector1">
-            <a:avLst/>
-          </a:prstGeom>
-          <a:ln>
-            <a:solidFill>
-              <a:schemeClr val="tx1"/>
-            </a:solidFill>
+            <a:headEnd type="triangle"/>
             <a:tailEnd type="triangle"/>
           </a:ln>
         </p:spPr>
@@ -5522,13 +5641,6 @@
   <p:clrMapOvr>
     <a:masterClrMapping/>
   </p:clrMapOvr>
-  <p:timing>
-    <p:tnLst>
-      <p:par>
-        <p:cTn id="1" dur="indefinite" restart="never" nodeType="tmRoot"/>
-      </p:par>
-    </p:tnLst>
-  </p:timing>
 </p:sld>
 </file>
 
@@ -5575,7 +5687,7 @@
     </a:clrScheme>
     <a:fontScheme name="Office">
       <a:majorFont>
-        <a:latin typeface="Calibri Light" panose="020F0302020204030204"/>
+        <a:latin typeface="Calibri Light"/>
         <a:ea typeface=""/>
         <a:cs typeface=""/>
         <a:font script="Jpan" typeface="游ゴシック Light"/>
@@ -5610,7 +5722,7 @@
         <a:font script="Geor" typeface="Sylfaen"/>
       </a:majorFont>
       <a:minorFont>
-        <a:latin typeface="Calibri" panose="020F0502020204030204"/>
+        <a:latin typeface="Calibri"/>
         <a:ea typeface=""/>
         <a:cs typeface=""/>
         <a:font script="Jpan" typeface="游ゴシック"/>

</xml_diff>